<commit_message>
ER and Schema Updates
</commit_message>
<xml_diff>
--- a/ER.pptx
+++ b/ER.pptx
@@ -8,7 +8,7 @@
     <p:sldId id="256" r:id="rId2"/>
   </p:sldIdLst>
   <p:sldSz cx="12192000" cy="6858000"/>
-  <p:notesSz cx="6858000" cy="9144000"/>
+  <p:notesSz cx="7010400" cy="9296400"/>
   <p:defaultTextStyle>
     <a:defPPr>
       <a:defRPr lang="en-US"/>
@@ -2969,2048 +2969,2063 @@
           <a:chExt cx="0" cy="0"/>
         </a:xfrm>
       </p:grpSpPr>
-      <p:sp>
-        <p:nvSpPr>
-          <p:cNvPr id="4" name="Rectangle 3"/>
-          <p:cNvSpPr/>
+      <p:grpSp>
+        <p:nvGrpSpPr>
+          <p:cNvPr id="2" name="Group 1"/>
+          <p:cNvGrpSpPr/>
           <p:nvPr/>
-        </p:nvSpPr>
-        <p:spPr>
+        </p:nvGrpSpPr>
+        <p:grpSpPr>
           <a:xfrm>
-            <a:off x="2217612" y="1111549"/>
-            <a:ext cx="1537481" cy="598476"/>
+            <a:off x="449832" y="710209"/>
+            <a:ext cx="11458575" cy="5761033"/>
+            <a:chOff x="449832" y="710209"/>
+            <a:chExt cx="11458575" cy="5761033"/>
           </a:xfrm>
-          <a:prstGeom prst="rect">
-            <a:avLst/>
-          </a:prstGeom>
-          <a:noFill/>
-          <a:ln>
-            <a:solidFill>
-              <a:schemeClr val="tx1"/>
-            </a:solidFill>
-          </a:ln>
-        </p:spPr>
-        <p:style>
-          <a:lnRef idx="2">
-            <a:schemeClr val="accent1">
-              <a:shade val="50000"/>
-            </a:schemeClr>
-          </a:lnRef>
-          <a:fillRef idx="1">
-            <a:schemeClr val="accent1"/>
-          </a:fillRef>
-          <a:effectRef idx="0">
-            <a:schemeClr val="accent1"/>
-          </a:effectRef>
-          <a:fontRef idx="minor">
-            <a:schemeClr val="lt1"/>
-          </a:fontRef>
-        </p:style>
-        <p:txBody>
-          <a:bodyPr rtlCol="0" anchor="ctr"/>
-          <a:lstStyle/>
-          <a:p>
-            <a:pPr algn="ctr"/>
-            <a:r>
-              <a:rPr lang="en-US" dirty="0" smtClean="0">
+        </p:grpSpPr>
+        <p:sp>
+          <p:nvSpPr>
+            <p:cNvPr id="4" name="Rectangle 3"/>
+            <p:cNvSpPr/>
+            <p:nvPr/>
+          </p:nvSpPr>
+          <p:spPr>
+            <a:xfrm>
+              <a:off x="2562669" y="1689519"/>
+              <a:ext cx="1537481" cy="598476"/>
+            </a:xfrm>
+            <a:prstGeom prst="rect">
+              <a:avLst/>
+            </a:prstGeom>
+            <a:noFill/>
+            <a:ln>
+              <a:solidFill>
+                <a:schemeClr val="tx1"/>
+              </a:solidFill>
+            </a:ln>
+          </p:spPr>
+          <p:style>
+            <a:lnRef idx="2">
+              <a:schemeClr val="accent1">
+                <a:shade val="50000"/>
+              </a:schemeClr>
+            </a:lnRef>
+            <a:fillRef idx="1">
+              <a:schemeClr val="accent1"/>
+            </a:fillRef>
+            <a:effectRef idx="0">
+              <a:schemeClr val="accent1"/>
+            </a:effectRef>
+            <a:fontRef idx="minor">
+              <a:schemeClr val="lt1"/>
+            </a:fontRef>
+          </p:style>
+          <p:txBody>
+            <a:bodyPr rtlCol="0" anchor="ctr"/>
+            <a:lstStyle/>
+            <a:p>
+              <a:pPr algn="ctr"/>
+              <a:r>
+                <a:rPr lang="en-US" dirty="0" smtClean="0">
+                  <a:solidFill>
+                    <a:schemeClr val="tx1"/>
+                  </a:solidFill>
+                </a:rPr>
+                <a:t>Character</a:t>
+              </a:r>
+              <a:endParaRPr lang="en-US" dirty="0">
                 <a:solidFill>
                   <a:schemeClr val="tx1"/>
                 </a:solidFill>
-              </a:rPr>
-              <a:t>Character</a:t>
-            </a:r>
-            <a:endParaRPr lang="en-US" dirty="0">
-              <a:solidFill>
-                <a:schemeClr val="tx1"/>
-              </a:solidFill>
-            </a:endParaRPr>
-          </a:p>
-        </p:txBody>
-      </p:sp>
-      <p:sp>
-        <p:nvSpPr>
-          <p:cNvPr id="5" name="Oval 4"/>
-          <p:cNvSpPr/>
-          <p:nvPr/>
-        </p:nvSpPr>
-        <p:spPr>
-          <a:xfrm>
-            <a:off x="2009236" y="300202"/>
-            <a:ext cx="629728" cy="388189"/>
-          </a:xfrm>
-          <a:prstGeom prst="ellipse">
-            <a:avLst/>
-          </a:prstGeom>
-          <a:ln/>
-        </p:spPr>
-        <p:style>
-          <a:lnRef idx="2">
-            <a:schemeClr val="accent6"/>
-          </a:lnRef>
-          <a:fillRef idx="1">
-            <a:schemeClr val="lt1"/>
-          </a:fillRef>
-          <a:effectRef idx="0">
-            <a:schemeClr val="accent6"/>
-          </a:effectRef>
-          <a:fontRef idx="minor">
-            <a:schemeClr val="dk1"/>
-          </a:fontRef>
-        </p:style>
-        <p:txBody>
-          <a:bodyPr rtlCol="0" anchor="ctr"/>
-          <a:lstStyle/>
-          <a:p>
-            <a:pPr algn="ctr"/>
-            <a:r>
-              <a:rPr lang="en-US" sz="1400" u="sng" dirty="0" smtClean="0">
+              </a:endParaRPr>
+            </a:p>
+          </p:txBody>
+        </p:sp>
+        <p:sp>
+          <p:nvSpPr>
+            <p:cNvPr id="5" name="Oval 4"/>
+            <p:cNvSpPr/>
+            <p:nvPr/>
+          </p:nvSpPr>
+          <p:spPr>
+            <a:xfrm>
+              <a:off x="2354293" y="878172"/>
+              <a:ext cx="629728" cy="388189"/>
+            </a:xfrm>
+            <a:prstGeom prst="ellipse">
+              <a:avLst/>
+            </a:prstGeom>
+            <a:ln/>
+          </p:spPr>
+          <p:style>
+            <a:lnRef idx="2">
+              <a:schemeClr val="accent6"/>
+            </a:lnRef>
+            <a:fillRef idx="1">
+              <a:schemeClr val="lt1"/>
+            </a:fillRef>
+            <a:effectRef idx="0">
+              <a:schemeClr val="accent6"/>
+            </a:effectRef>
+            <a:fontRef idx="minor">
+              <a:schemeClr val="dk1"/>
+            </a:fontRef>
+          </p:style>
+          <p:txBody>
+            <a:bodyPr rtlCol="0" anchor="ctr"/>
+            <a:lstStyle/>
+            <a:p>
+              <a:pPr algn="ctr"/>
+              <a:r>
+                <a:rPr lang="en-US" sz="1400" u="sng" dirty="0" smtClean="0">
+                  <a:solidFill>
+                    <a:schemeClr val="tx1"/>
+                  </a:solidFill>
+                </a:rPr>
+                <a:t>CID</a:t>
+              </a:r>
+              <a:endParaRPr lang="en-US" sz="1400" u="sng" dirty="0">
                 <a:solidFill>
                   <a:schemeClr val="tx1"/>
                 </a:solidFill>
-              </a:rPr>
-              <a:t>CID</a:t>
-            </a:r>
-            <a:endParaRPr lang="en-US" sz="1400" u="sng" dirty="0">
-              <a:solidFill>
-                <a:schemeClr val="tx1"/>
-              </a:solidFill>
-            </a:endParaRPr>
-          </a:p>
-        </p:txBody>
-      </p:sp>
-      <p:sp>
-        <p:nvSpPr>
-          <p:cNvPr id="6" name="Oval 5"/>
-          <p:cNvSpPr/>
-          <p:nvPr/>
-        </p:nvSpPr>
-        <p:spPr>
-          <a:xfrm>
-            <a:off x="2753264" y="231191"/>
-            <a:ext cx="681487" cy="457200"/>
-          </a:xfrm>
-          <a:prstGeom prst="ellipse">
-            <a:avLst/>
-          </a:prstGeom>
-          <a:ln/>
-        </p:spPr>
-        <p:style>
-          <a:lnRef idx="2">
-            <a:schemeClr val="accent6"/>
-          </a:lnRef>
-          <a:fillRef idx="1">
-            <a:schemeClr val="lt1"/>
-          </a:fillRef>
-          <a:effectRef idx="0">
-            <a:schemeClr val="accent6"/>
-          </a:effectRef>
-          <a:fontRef idx="minor">
-            <a:schemeClr val="dk1"/>
-          </a:fontRef>
-        </p:style>
-        <p:txBody>
-          <a:bodyPr lIns="0" tIns="0" rIns="0" bIns="0" rtlCol="0" anchor="ctr"/>
-          <a:lstStyle/>
-          <a:p>
-            <a:pPr algn="ctr"/>
-            <a:r>
-              <a:rPr lang="en-US" sz="1200" dirty="0" smtClean="0"/>
-              <a:t>Name</a:t>
-            </a:r>
-            <a:endParaRPr lang="en-US" sz="1100" dirty="0"/>
-          </a:p>
-        </p:txBody>
-      </p:sp>
-      <p:cxnSp>
-        <p:nvCxnSpPr>
-          <p:cNvPr id="8" name="Straight Connector 7"/>
-          <p:cNvCxnSpPr>
-            <a:stCxn id="5" idx="4"/>
-          </p:cNvCxnSpPr>
-          <p:nvPr/>
-        </p:nvCxnSpPr>
-        <p:spPr>
-          <a:xfrm>
-            <a:off x="2324100" y="688391"/>
-            <a:ext cx="102258" cy="424131"/>
-          </a:xfrm>
-          <a:prstGeom prst="line">
-            <a:avLst/>
-          </a:prstGeom>
-        </p:spPr>
-        <p:style>
-          <a:lnRef idx="1">
-            <a:schemeClr val="accent6"/>
-          </a:lnRef>
-          <a:fillRef idx="0">
-            <a:schemeClr val="accent6"/>
-          </a:fillRef>
-          <a:effectRef idx="0">
-            <a:schemeClr val="accent6"/>
-          </a:effectRef>
-          <a:fontRef idx="minor">
-            <a:schemeClr val="tx1"/>
-          </a:fontRef>
-        </p:style>
-      </p:cxnSp>
-      <p:cxnSp>
-        <p:nvCxnSpPr>
-          <p:cNvPr id="10" name="Straight Connector 9"/>
-          <p:cNvCxnSpPr>
-            <a:stCxn id="6" idx="4"/>
-          </p:cNvCxnSpPr>
-          <p:nvPr/>
-        </p:nvCxnSpPr>
-        <p:spPr>
-          <a:xfrm flipH="1">
-            <a:off x="2943042" y="688391"/>
-            <a:ext cx="150966" cy="424131"/>
-          </a:xfrm>
-          <a:prstGeom prst="line">
-            <a:avLst/>
-          </a:prstGeom>
-        </p:spPr>
-        <p:style>
-          <a:lnRef idx="1">
-            <a:schemeClr val="accent6"/>
-          </a:lnRef>
-          <a:fillRef idx="0">
-            <a:schemeClr val="accent6"/>
-          </a:fillRef>
-          <a:effectRef idx="0">
-            <a:schemeClr val="accent6"/>
-          </a:effectRef>
-          <a:fontRef idx="minor">
-            <a:schemeClr val="tx1"/>
-          </a:fontRef>
-        </p:style>
-      </p:cxnSp>
-      <p:sp>
-        <p:nvSpPr>
-          <p:cNvPr id="11" name="Diamond 10"/>
-          <p:cNvSpPr/>
-          <p:nvPr/>
-        </p:nvSpPr>
-        <p:spPr>
-          <a:xfrm>
-            <a:off x="503569" y="909367"/>
-            <a:ext cx="1057275" cy="1022607"/>
-          </a:xfrm>
-          <a:prstGeom prst="diamond">
-            <a:avLst/>
-          </a:prstGeom>
-        </p:spPr>
-        <p:style>
-          <a:lnRef idx="2">
-            <a:schemeClr val="accent2"/>
-          </a:lnRef>
-          <a:fillRef idx="1">
-            <a:schemeClr val="lt1"/>
-          </a:fillRef>
-          <a:effectRef idx="0">
-            <a:schemeClr val="accent2"/>
-          </a:effectRef>
-          <a:fontRef idx="minor">
-            <a:schemeClr val="dk1"/>
-          </a:fontRef>
-        </p:style>
-        <p:txBody>
-          <a:bodyPr lIns="0" tIns="0" rIns="0" bIns="0" rtlCol="0" anchor="ctr"/>
-          <a:lstStyle/>
-          <a:p>
-            <a:pPr algn="ctr"/>
-            <a:r>
-              <a:rPr lang="en-US" sz="1200" dirty="0" smtClean="0"/>
-              <a:t>Related to</a:t>
-            </a:r>
-            <a:endParaRPr lang="en-US" sz="1200" dirty="0"/>
-          </a:p>
-        </p:txBody>
-      </p:sp>
-      <p:sp>
-        <p:nvSpPr>
-          <p:cNvPr id="20" name="Arc 19"/>
-          <p:cNvSpPr/>
-          <p:nvPr/>
-        </p:nvSpPr>
-        <p:spPr>
-          <a:xfrm>
-            <a:off x="1160337" y="909366"/>
-            <a:ext cx="1107061" cy="1022607"/>
-          </a:xfrm>
-          <a:prstGeom prst="arc">
-            <a:avLst>
-              <a:gd name="adj1" fmla="val 12646492"/>
-              <a:gd name="adj2" fmla="val 20261718"/>
-            </a:avLst>
-          </a:prstGeom>
-        </p:spPr>
-        <p:style>
-          <a:lnRef idx="1">
-            <a:schemeClr val="accent2"/>
-          </a:lnRef>
-          <a:fillRef idx="0">
-            <a:schemeClr val="accent2"/>
-          </a:fillRef>
-          <a:effectRef idx="0">
-            <a:schemeClr val="accent2"/>
-          </a:effectRef>
-          <a:fontRef idx="minor">
-            <a:schemeClr val="tx1"/>
-          </a:fontRef>
-        </p:style>
-        <p:txBody>
-          <a:bodyPr rtlCol="0" anchor="ctr"/>
-          <a:lstStyle/>
-          <a:p>
-            <a:pPr algn="ctr"/>
-            <a:endParaRPr lang="en-US"/>
-          </a:p>
-        </p:txBody>
-      </p:sp>
-      <p:sp>
-        <p:nvSpPr>
-          <p:cNvPr id="22" name="Arc 21"/>
-          <p:cNvSpPr/>
-          <p:nvPr/>
-        </p:nvSpPr>
-        <p:spPr>
-          <a:xfrm rot="9536355">
-            <a:off x="1153106" y="978602"/>
-            <a:ext cx="1163582" cy="1105725"/>
-          </a:xfrm>
-          <a:prstGeom prst="arc">
-            <a:avLst>
-              <a:gd name="adj1" fmla="val 13183303"/>
-              <a:gd name="adj2" fmla="val 21348145"/>
-            </a:avLst>
-          </a:prstGeom>
-        </p:spPr>
-        <p:style>
-          <a:lnRef idx="1">
-            <a:schemeClr val="accent2"/>
-          </a:lnRef>
-          <a:fillRef idx="0">
-            <a:schemeClr val="accent2"/>
-          </a:fillRef>
-          <a:effectRef idx="0">
-            <a:schemeClr val="accent2"/>
-          </a:effectRef>
-          <a:fontRef idx="minor">
-            <a:schemeClr val="tx1"/>
-          </a:fontRef>
-        </p:style>
-        <p:txBody>
-          <a:bodyPr rtlCol="0" anchor="ctr"/>
-          <a:lstStyle/>
-          <a:p>
-            <a:pPr algn="ctr"/>
-            <a:endParaRPr lang="en-US"/>
-          </a:p>
-        </p:txBody>
-      </p:sp>
-      <p:sp>
-        <p:nvSpPr>
-          <p:cNvPr id="23" name="Oval 22"/>
-          <p:cNvSpPr/>
-          <p:nvPr/>
-        </p:nvSpPr>
-        <p:spPr>
-          <a:xfrm>
-            <a:off x="104775" y="552450"/>
-            <a:ext cx="628650" cy="476250"/>
-          </a:xfrm>
-          <a:prstGeom prst="ellipse">
-            <a:avLst/>
-          </a:prstGeom>
-        </p:spPr>
-        <p:style>
-          <a:lnRef idx="2">
-            <a:schemeClr val="accent6"/>
-          </a:lnRef>
-          <a:fillRef idx="1">
-            <a:schemeClr val="lt1"/>
-          </a:fillRef>
-          <a:effectRef idx="0">
-            <a:schemeClr val="accent6"/>
-          </a:effectRef>
-          <a:fontRef idx="minor">
-            <a:schemeClr val="dk1"/>
-          </a:fontRef>
-        </p:style>
-        <p:txBody>
-          <a:bodyPr lIns="0" tIns="0" rIns="0" bIns="0" rtlCol="0" anchor="ctr"/>
-          <a:lstStyle/>
-          <a:p>
-            <a:pPr algn="ctr"/>
-            <a:r>
-              <a:rPr lang="en-US" sz="1400" dirty="0" smtClean="0"/>
-              <a:t>Type</a:t>
-            </a:r>
-            <a:endParaRPr lang="en-US" sz="1400" dirty="0"/>
-          </a:p>
-        </p:txBody>
-      </p:sp>
-      <p:cxnSp>
-        <p:nvCxnSpPr>
-          <p:cNvPr id="25" name="Straight Connector 24"/>
-          <p:cNvCxnSpPr>
-            <a:stCxn id="23" idx="5"/>
-          </p:cNvCxnSpPr>
-          <p:nvPr/>
-        </p:nvCxnSpPr>
-        <p:spPr>
-          <a:xfrm>
-            <a:off x="641361" y="958955"/>
-            <a:ext cx="177789" cy="152594"/>
-          </a:xfrm>
-          <a:prstGeom prst="line">
-            <a:avLst/>
-          </a:prstGeom>
-        </p:spPr>
-        <p:style>
-          <a:lnRef idx="1">
-            <a:schemeClr val="accent6"/>
-          </a:lnRef>
-          <a:fillRef idx="0">
-            <a:schemeClr val="accent6"/>
-          </a:fillRef>
-          <a:effectRef idx="0">
-            <a:schemeClr val="accent6"/>
-          </a:effectRef>
-          <a:fontRef idx="minor">
-            <a:schemeClr val="tx1"/>
-          </a:fontRef>
-        </p:style>
-      </p:cxnSp>
-      <p:sp>
-        <p:nvSpPr>
-          <p:cNvPr id="26" name="Oval 25"/>
-          <p:cNvSpPr/>
-          <p:nvPr/>
-        </p:nvSpPr>
-        <p:spPr>
-          <a:xfrm>
-            <a:off x="3494660" y="236390"/>
-            <a:ext cx="813266" cy="516045"/>
-          </a:xfrm>
-          <a:prstGeom prst="ellipse">
-            <a:avLst/>
-          </a:prstGeom>
-        </p:spPr>
-        <p:style>
-          <a:lnRef idx="2">
-            <a:schemeClr val="accent6"/>
-          </a:lnRef>
-          <a:fillRef idx="1">
-            <a:schemeClr val="lt1"/>
-          </a:fillRef>
-          <a:effectRef idx="0">
-            <a:schemeClr val="accent6"/>
-          </a:effectRef>
-          <a:fontRef idx="minor">
-            <a:schemeClr val="dk1"/>
-          </a:fontRef>
-        </p:style>
-        <p:txBody>
-          <a:bodyPr rtlCol="0" anchor="ctr"/>
-          <a:lstStyle/>
-          <a:p>
-            <a:pPr algn="ctr"/>
-            <a:r>
-              <a:rPr lang="en-US" sz="1200" dirty="0" smtClean="0"/>
-              <a:t>Dead/Alive</a:t>
-            </a:r>
-            <a:endParaRPr lang="en-US" sz="1200" dirty="0"/>
-          </a:p>
-        </p:txBody>
-      </p:sp>
-      <p:cxnSp>
-        <p:nvCxnSpPr>
-          <p:cNvPr id="28" name="Straight Connector 27"/>
-          <p:cNvCxnSpPr/>
-          <p:nvPr/>
-        </p:nvCxnSpPr>
-        <p:spPr>
-          <a:xfrm flipV="1">
-            <a:off x="3549051" y="720413"/>
-            <a:ext cx="201725" cy="391138"/>
-          </a:xfrm>
-          <a:prstGeom prst="line">
-            <a:avLst/>
-          </a:prstGeom>
-        </p:spPr>
-        <p:style>
-          <a:lnRef idx="1">
-            <a:schemeClr val="accent6"/>
-          </a:lnRef>
-          <a:fillRef idx="0">
-            <a:schemeClr val="accent6"/>
-          </a:fillRef>
-          <a:effectRef idx="0">
-            <a:schemeClr val="accent6"/>
-          </a:effectRef>
-          <a:fontRef idx="minor">
-            <a:schemeClr val="tx1"/>
-          </a:fontRef>
-        </p:style>
-      </p:cxnSp>
-      <p:sp>
-        <p:nvSpPr>
-          <p:cNvPr id="31" name="Oval 30"/>
-          <p:cNvSpPr/>
-          <p:nvPr/>
-        </p:nvSpPr>
-        <p:spPr>
-          <a:xfrm>
-            <a:off x="1496772" y="2374538"/>
-            <a:ext cx="827328" cy="561975"/>
-          </a:xfrm>
-          <a:prstGeom prst="ellipse">
-            <a:avLst/>
-          </a:prstGeom>
-        </p:spPr>
-        <p:style>
-          <a:lnRef idx="2">
-            <a:schemeClr val="accent6"/>
-          </a:lnRef>
-          <a:fillRef idx="1">
-            <a:schemeClr val="lt1"/>
-          </a:fillRef>
-          <a:effectRef idx="0">
-            <a:schemeClr val="accent6"/>
-          </a:effectRef>
-          <a:fontRef idx="minor">
-            <a:schemeClr val="dk1"/>
-          </a:fontRef>
-        </p:style>
-        <p:txBody>
-          <a:bodyPr rtlCol="0" anchor="ctr"/>
-          <a:lstStyle/>
-          <a:p>
-            <a:pPr algn="ctr"/>
-            <a:r>
-              <a:rPr lang="en-US" sz="1200" dirty="0" smtClean="0"/>
-              <a:t>Social Status</a:t>
-            </a:r>
-            <a:endParaRPr lang="en-US" sz="1200" dirty="0"/>
-          </a:p>
-        </p:txBody>
-      </p:sp>
-      <p:cxnSp>
-        <p:nvCxnSpPr>
-          <p:cNvPr id="33" name="Straight Connector 32"/>
-          <p:cNvCxnSpPr>
-            <a:stCxn id="31" idx="7"/>
-          </p:cNvCxnSpPr>
-          <p:nvPr/>
-        </p:nvCxnSpPr>
-        <p:spPr>
-          <a:xfrm flipV="1">
-            <a:off x="2202941" y="1710025"/>
-            <a:ext cx="273559" cy="746812"/>
-          </a:xfrm>
-          <a:prstGeom prst="line">
-            <a:avLst/>
-          </a:prstGeom>
-        </p:spPr>
-        <p:style>
-          <a:lnRef idx="1">
-            <a:schemeClr val="accent6"/>
-          </a:lnRef>
-          <a:fillRef idx="0">
-            <a:schemeClr val="accent6"/>
-          </a:fillRef>
-          <a:effectRef idx="0">
-            <a:schemeClr val="accent6"/>
-          </a:effectRef>
-          <a:fontRef idx="minor">
-            <a:schemeClr val="tx1"/>
-          </a:fontRef>
-        </p:style>
-      </p:cxnSp>
-      <p:sp>
-        <p:nvSpPr>
-          <p:cNvPr id="34" name="Diamond 33"/>
-          <p:cNvSpPr/>
-          <p:nvPr/>
-        </p:nvSpPr>
-        <p:spPr>
-          <a:xfrm>
-            <a:off x="5438775" y="1070124"/>
-            <a:ext cx="762000" cy="681325"/>
-          </a:xfrm>
-          <a:prstGeom prst="diamond">
-            <a:avLst/>
-          </a:prstGeom>
-        </p:spPr>
-        <p:style>
-          <a:lnRef idx="2">
-            <a:schemeClr val="accent2"/>
-          </a:lnRef>
-          <a:fillRef idx="1">
-            <a:schemeClr val="lt1"/>
-          </a:fillRef>
-          <a:effectRef idx="0">
-            <a:schemeClr val="accent2"/>
-          </a:effectRef>
-          <a:fontRef idx="minor">
-            <a:schemeClr val="dk1"/>
-          </a:fontRef>
-        </p:style>
-        <p:txBody>
-          <a:bodyPr lIns="0" tIns="0" rIns="0" bIns="0" rtlCol="0" anchor="ctr"/>
-          <a:lstStyle/>
-          <a:p>
-            <a:pPr algn="ctr"/>
-            <a:r>
-              <a:rPr lang="en-US" sz="1400" dirty="0" smtClean="0"/>
-              <a:t>Has</a:t>
-            </a:r>
-            <a:endParaRPr lang="en-US" sz="1400" dirty="0"/>
-          </a:p>
-        </p:txBody>
-      </p:sp>
-      <p:cxnSp>
-        <p:nvCxnSpPr>
-          <p:cNvPr id="36" name="Straight Connector 35"/>
-          <p:cNvCxnSpPr>
-            <a:stCxn id="4" idx="3"/>
-            <a:endCxn id="34" idx="1"/>
-          </p:cNvCxnSpPr>
-          <p:nvPr/>
-        </p:nvCxnSpPr>
-        <p:spPr>
-          <a:xfrm>
-            <a:off x="3755093" y="1410787"/>
-            <a:ext cx="1683682" cy="0"/>
-          </a:xfrm>
-          <a:prstGeom prst="line">
-            <a:avLst/>
-          </a:prstGeom>
-        </p:spPr>
-        <p:style>
-          <a:lnRef idx="1">
-            <a:schemeClr val="accent2"/>
-          </a:lnRef>
-          <a:fillRef idx="0">
-            <a:schemeClr val="accent2"/>
-          </a:fillRef>
-          <a:effectRef idx="0">
-            <a:schemeClr val="accent2"/>
-          </a:effectRef>
-          <a:fontRef idx="minor">
-            <a:schemeClr val="tx1"/>
-          </a:fontRef>
-        </p:style>
-      </p:cxnSp>
-      <p:sp>
-        <p:nvSpPr>
-          <p:cNvPr id="39" name="Rectangle 38"/>
-          <p:cNvSpPr/>
-          <p:nvPr/>
-        </p:nvSpPr>
-        <p:spPr>
-          <a:xfrm>
-            <a:off x="7334251" y="1111549"/>
-            <a:ext cx="933450" cy="598476"/>
-          </a:xfrm>
-          <a:prstGeom prst="rect">
-            <a:avLst/>
-          </a:prstGeom>
-        </p:spPr>
-        <p:style>
-          <a:lnRef idx="2">
-            <a:schemeClr val="dk1"/>
-          </a:lnRef>
-          <a:fillRef idx="1">
-            <a:schemeClr val="lt1"/>
-          </a:fillRef>
-          <a:effectRef idx="0">
-            <a:schemeClr val="dk1"/>
-          </a:effectRef>
-          <a:fontRef idx="minor">
-            <a:schemeClr val="dk1"/>
-          </a:fontRef>
-        </p:style>
-        <p:txBody>
-          <a:bodyPr rtlCol="0" anchor="ctr"/>
-          <a:lstStyle/>
-          <a:p>
-            <a:pPr algn="ctr"/>
-            <a:r>
-              <a:rPr lang="en-US" dirty="0" smtClean="0"/>
-              <a:t>House</a:t>
-            </a:r>
-            <a:endParaRPr lang="en-US" dirty="0"/>
-          </a:p>
-        </p:txBody>
-      </p:sp>
-      <p:cxnSp>
-        <p:nvCxnSpPr>
-          <p:cNvPr id="41" name="Straight Connector 40"/>
-          <p:cNvCxnSpPr/>
-          <p:nvPr/>
-        </p:nvCxnSpPr>
-        <p:spPr>
-          <a:xfrm>
-            <a:off x="6105525" y="1323975"/>
-            <a:ext cx="1228726" cy="10612"/>
-          </a:xfrm>
-          <a:prstGeom prst="line">
-            <a:avLst/>
-          </a:prstGeom>
-        </p:spPr>
-        <p:style>
-          <a:lnRef idx="1">
-            <a:schemeClr val="accent2"/>
-          </a:lnRef>
-          <a:fillRef idx="0">
-            <a:schemeClr val="accent2"/>
-          </a:fillRef>
-          <a:effectRef idx="0">
-            <a:schemeClr val="accent2"/>
-          </a:effectRef>
-          <a:fontRef idx="minor">
-            <a:schemeClr val="tx1"/>
-          </a:fontRef>
-        </p:style>
-      </p:cxnSp>
-      <p:cxnSp>
-        <p:nvCxnSpPr>
-          <p:cNvPr id="43" name="Straight Connector 42"/>
-          <p:cNvCxnSpPr/>
-          <p:nvPr/>
-        </p:nvCxnSpPr>
-        <p:spPr>
-          <a:xfrm flipV="1">
-            <a:off x="6105525" y="1508675"/>
-            <a:ext cx="1228726" cy="8438"/>
-          </a:xfrm>
-          <a:prstGeom prst="line">
-            <a:avLst/>
-          </a:prstGeom>
-        </p:spPr>
-        <p:style>
-          <a:lnRef idx="1">
-            <a:schemeClr val="accent2"/>
-          </a:lnRef>
-          <a:fillRef idx="0">
-            <a:schemeClr val="accent2"/>
-          </a:fillRef>
-          <a:effectRef idx="0">
-            <a:schemeClr val="accent2"/>
-          </a:effectRef>
-          <a:fontRef idx="minor">
-            <a:schemeClr val="tx1"/>
-          </a:fontRef>
-        </p:style>
-      </p:cxnSp>
-      <p:sp>
-        <p:nvSpPr>
-          <p:cNvPr id="46" name="Oval 45"/>
-          <p:cNvSpPr/>
-          <p:nvPr/>
-        </p:nvSpPr>
-        <p:spPr>
-          <a:xfrm>
-            <a:off x="6719888" y="198018"/>
-            <a:ext cx="704850" cy="490373"/>
-          </a:xfrm>
-          <a:prstGeom prst="ellipse">
-            <a:avLst/>
-          </a:prstGeom>
-        </p:spPr>
-        <p:style>
-          <a:lnRef idx="2">
-            <a:schemeClr val="accent6"/>
-          </a:lnRef>
-          <a:fillRef idx="1">
-            <a:schemeClr val="lt1"/>
-          </a:fillRef>
-          <a:effectRef idx="0">
-            <a:schemeClr val="accent6"/>
-          </a:effectRef>
-          <a:fontRef idx="minor">
-            <a:schemeClr val="dk1"/>
-          </a:fontRef>
-        </p:style>
-        <p:txBody>
-          <a:bodyPr lIns="0" tIns="0" rIns="0" bIns="0" rtlCol="0" anchor="ctr"/>
-          <a:lstStyle/>
-          <a:p>
-            <a:pPr algn="ctr"/>
-            <a:r>
-              <a:rPr lang="en-US" sz="1400" u="sng" dirty="0" smtClean="0"/>
-              <a:t>Name</a:t>
-            </a:r>
-            <a:endParaRPr lang="en-US" sz="1400" u="sng" dirty="0"/>
-          </a:p>
-        </p:txBody>
-      </p:sp>
-      <p:cxnSp>
-        <p:nvCxnSpPr>
-          <p:cNvPr id="48" name="Straight Connector 47"/>
-          <p:cNvCxnSpPr>
-            <a:stCxn id="46" idx="4"/>
-          </p:cNvCxnSpPr>
-          <p:nvPr/>
-        </p:nvCxnSpPr>
-        <p:spPr>
-          <a:xfrm>
-            <a:off x="7072313" y="688391"/>
-            <a:ext cx="366712" cy="442672"/>
-          </a:xfrm>
-          <a:prstGeom prst="line">
-            <a:avLst/>
-          </a:prstGeom>
-        </p:spPr>
-        <p:style>
-          <a:lnRef idx="1">
-            <a:schemeClr val="accent6"/>
-          </a:lnRef>
-          <a:fillRef idx="0">
-            <a:schemeClr val="accent6"/>
-          </a:fillRef>
-          <a:effectRef idx="0">
-            <a:schemeClr val="accent6"/>
-          </a:effectRef>
-          <a:fontRef idx="minor">
-            <a:schemeClr val="tx1"/>
-          </a:fontRef>
-        </p:style>
-      </p:cxnSp>
-      <p:sp>
-        <p:nvSpPr>
-          <p:cNvPr id="49" name="Oval 48"/>
-          <p:cNvSpPr/>
-          <p:nvPr/>
-        </p:nvSpPr>
-        <p:spPr>
-          <a:xfrm>
-            <a:off x="7593063" y="132239"/>
-            <a:ext cx="685800" cy="420211"/>
-          </a:xfrm>
-          <a:prstGeom prst="ellipse">
-            <a:avLst/>
-          </a:prstGeom>
-        </p:spPr>
-        <p:style>
-          <a:lnRef idx="2">
-            <a:schemeClr val="accent6"/>
-          </a:lnRef>
-          <a:fillRef idx="1">
-            <a:schemeClr val="lt1"/>
-          </a:fillRef>
-          <a:effectRef idx="0">
-            <a:schemeClr val="accent6"/>
-          </a:effectRef>
-          <a:fontRef idx="minor">
-            <a:schemeClr val="dk1"/>
-          </a:fontRef>
-        </p:style>
-        <p:txBody>
-          <a:bodyPr lIns="0" tIns="0" rIns="0" bIns="0" rtlCol="0" anchor="ctr"/>
-          <a:lstStyle/>
-          <a:p>
-            <a:pPr algn="ctr"/>
-            <a:r>
-              <a:rPr lang="en-US" sz="1400" dirty="0" smtClean="0"/>
-              <a:t>Words</a:t>
-            </a:r>
-            <a:endParaRPr lang="en-US" sz="1200" dirty="0"/>
-          </a:p>
-        </p:txBody>
-      </p:sp>
-      <p:cxnSp>
-        <p:nvCxnSpPr>
-          <p:cNvPr id="51" name="Straight Connector 50"/>
-          <p:cNvCxnSpPr>
-            <a:stCxn id="49" idx="4"/>
-            <a:endCxn id="39" idx="0"/>
-          </p:cNvCxnSpPr>
-          <p:nvPr/>
-        </p:nvCxnSpPr>
-        <p:spPr>
-          <a:xfrm flipH="1">
-            <a:off x="7800976" y="552450"/>
-            <a:ext cx="134987" cy="559099"/>
-          </a:xfrm>
-          <a:prstGeom prst="line">
-            <a:avLst/>
-          </a:prstGeom>
-        </p:spPr>
-        <p:style>
-          <a:lnRef idx="1">
-            <a:schemeClr val="accent6"/>
-          </a:lnRef>
-          <a:fillRef idx="0">
-            <a:schemeClr val="accent6"/>
-          </a:fillRef>
-          <a:effectRef idx="0">
-            <a:schemeClr val="accent6"/>
-          </a:effectRef>
-          <a:fontRef idx="minor">
-            <a:schemeClr val="tx1"/>
-          </a:fontRef>
-        </p:style>
-      </p:cxnSp>
-      <p:sp>
-        <p:nvSpPr>
-          <p:cNvPr id="52" name="Oval 51"/>
-          <p:cNvSpPr/>
-          <p:nvPr/>
-        </p:nvSpPr>
-        <p:spPr>
-          <a:xfrm>
-            <a:off x="8447188" y="144355"/>
-            <a:ext cx="790575" cy="489655"/>
-          </a:xfrm>
-          <a:prstGeom prst="ellipse">
-            <a:avLst/>
-          </a:prstGeom>
-        </p:spPr>
-        <p:style>
-          <a:lnRef idx="2">
-            <a:schemeClr val="accent6"/>
-          </a:lnRef>
-          <a:fillRef idx="1">
-            <a:schemeClr val="lt1"/>
-          </a:fillRef>
-          <a:effectRef idx="0">
-            <a:schemeClr val="accent6"/>
-          </a:effectRef>
-          <a:fontRef idx="minor">
-            <a:schemeClr val="dk1"/>
-          </a:fontRef>
-        </p:style>
-        <p:txBody>
-          <a:bodyPr lIns="0" tIns="0" rIns="0" bIns="0" rtlCol="0" anchor="ctr"/>
-          <a:lstStyle/>
-          <a:p>
-            <a:pPr algn="ctr"/>
-            <a:r>
-              <a:rPr lang="en-US" sz="1400" dirty="0" smtClean="0"/>
-              <a:t>Symbol</a:t>
-            </a:r>
-            <a:endParaRPr lang="en-US" sz="1400" dirty="0"/>
-          </a:p>
-        </p:txBody>
-      </p:sp>
-      <p:cxnSp>
-        <p:nvCxnSpPr>
-          <p:cNvPr id="54" name="Straight Connector 53"/>
-          <p:cNvCxnSpPr>
-            <a:endCxn id="52" idx="3"/>
-          </p:cNvCxnSpPr>
-          <p:nvPr/>
-        </p:nvCxnSpPr>
-        <p:spPr>
-          <a:xfrm flipV="1">
-            <a:off x="8143876" y="562302"/>
-            <a:ext cx="419089" cy="549247"/>
-          </a:xfrm>
-          <a:prstGeom prst="line">
-            <a:avLst/>
-          </a:prstGeom>
-        </p:spPr>
-        <p:style>
-          <a:lnRef idx="1">
-            <a:schemeClr val="accent6"/>
-          </a:lnRef>
-          <a:fillRef idx="0">
-            <a:schemeClr val="accent6"/>
-          </a:fillRef>
-          <a:effectRef idx="0">
-            <a:schemeClr val="accent6"/>
-          </a:effectRef>
-          <a:fontRef idx="minor">
-            <a:schemeClr val="tx1"/>
-          </a:fontRef>
-        </p:style>
-      </p:cxnSp>
-      <p:sp>
-        <p:nvSpPr>
-          <p:cNvPr id="55" name="Rectangle 54"/>
-          <p:cNvSpPr/>
-          <p:nvPr/>
-        </p:nvSpPr>
-        <p:spPr>
-          <a:xfrm>
-            <a:off x="9294913" y="2565157"/>
-            <a:ext cx="992087" cy="504825"/>
-          </a:xfrm>
-          <a:prstGeom prst="rect">
-            <a:avLst/>
-          </a:prstGeom>
-        </p:spPr>
-        <p:style>
-          <a:lnRef idx="2">
-            <a:schemeClr val="dk1"/>
-          </a:lnRef>
-          <a:fillRef idx="1">
-            <a:schemeClr val="lt1"/>
-          </a:fillRef>
-          <a:effectRef idx="0">
-            <a:schemeClr val="dk1"/>
-          </a:effectRef>
-          <a:fontRef idx="minor">
-            <a:schemeClr val="dk1"/>
-          </a:fontRef>
-        </p:style>
-        <p:txBody>
-          <a:bodyPr rtlCol="0" anchor="ctr"/>
-          <a:lstStyle/>
-          <a:p>
-            <a:pPr algn="ctr"/>
-            <a:r>
-              <a:rPr lang="en-US" dirty="0" smtClean="0"/>
-              <a:t>Region</a:t>
-            </a:r>
-            <a:endParaRPr lang="en-US" dirty="0"/>
-          </a:p>
-        </p:txBody>
-      </p:sp>
-      <p:sp>
-        <p:nvSpPr>
-          <p:cNvPr id="56" name="Diamond 55"/>
-          <p:cNvSpPr/>
-          <p:nvPr/>
-        </p:nvSpPr>
-        <p:spPr>
-          <a:xfrm>
-            <a:off x="8867776" y="1508675"/>
-            <a:ext cx="666750" cy="627692"/>
-          </a:xfrm>
-          <a:prstGeom prst="diamond">
-            <a:avLst/>
-          </a:prstGeom>
-        </p:spPr>
-        <p:style>
-          <a:lnRef idx="2">
-            <a:schemeClr val="accent2"/>
-          </a:lnRef>
-          <a:fillRef idx="1">
-            <a:schemeClr val="lt1"/>
-          </a:fillRef>
-          <a:effectRef idx="0">
-            <a:schemeClr val="accent2"/>
-          </a:effectRef>
-          <a:fontRef idx="minor">
-            <a:schemeClr val="dk1"/>
-          </a:fontRef>
-        </p:style>
-        <p:txBody>
-          <a:bodyPr rtlCol="0" anchor="ctr"/>
-          <a:lstStyle/>
-          <a:p>
-            <a:pPr algn="ctr"/>
-            <a:r>
-              <a:rPr lang="en-US" sz="1400" dirty="0" smtClean="0"/>
-              <a:t>In</a:t>
-            </a:r>
-            <a:endParaRPr lang="en-US" dirty="0"/>
-          </a:p>
-        </p:txBody>
-      </p:sp>
-      <p:cxnSp>
-        <p:nvCxnSpPr>
-          <p:cNvPr id="58" name="Straight Connector 57"/>
-          <p:cNvCxnSpPr>
-            <a:stCxn id="39" idx="3"/>
-          </p:cNvCxnSpPr>
-          <p:nvPr/>
-        </p:nvCxnSpPr>
-        <p:spPr>
-          <a:xfrm>
-            <a:off x="8267701" y="1410787"/>
-            <a:ext cx="733424" cy="299238"/>
-          </a:xfrm>
-          <a:prstGeom prst="line">
-            <a:avLst/>
-          </a:prstGeom>
-        </p:spPr>
-        <p:style>
-          <a:lnRef idx="1">
-            <a:schemeClr val="accent2"/>
-          </a:lnRef>
-          <a:fillRef idx="0">
-            <a:schemeClr val="accent2"/>
-          </a:fillRef>
-          <a:effectRef idx="0">
-            <a:schemeClr val="accent2"/>
-          </a:effectRef>
-          <a:fontRef idx="minor">
-            <a:schemeClr val="tx1"/>
-          </a:fontRef>
-        </p:style>
-      </p:cxnSp>
-      <p:cxnSp>
-        <p:nvCxnSpPr>
-          <p:cNvPr id="60" name="Straight Connector 59"/>
-          <p:cNvCxnSpPr>
-            <a:endCxn id="55" idx="0"/>
-          </p:cNvCxnSpPr>
-          <p:nvPr/>
-        </p:nvCxnSpPr>
-        <p:spPr>
-          <a:xfrm>
-            <a:off x="9363075" y="2000250"/>
-            <a:ext cx="427882" cy="564907"/>
-          </a:xfrm>
-          <a:prstGeom prst="line">
-            <a:avLst/>
-          </a:prstGeom>
-        </p:spPr>
-        <p:style>
-          <a:lnRef idx="1">
-            <a:schemeClr val="accent2"/>
-          </a:lnRef>
-          <a:fillRef idx="0">
-            <a:schemeClr val="accent2"/>
-          </a:fillRef>
-          <a:effectRef idx="0">
-            <a:schemeClr val="accent2"/>
-          </a:effectRef>
-          <a:fontRef idx="minor">
-            <a:schemeClr val="tx1"/>
-          </a:fontRef>
-        </p:style>
-      </p:cxnSp>
-      <p:sp>
-        <p:nvSpPr>
-          <p:cNvPr id="62" name="Oval 61"/>
-          <p:cNvSpPr/>
-          <p:nvPr/>
-        </p:nvSpPr>
-        <p:spPr>
-          <a:xfrm>
-            <a:off x="10877550" y="2587139"/>
-            <a:ext cx="685800" cy="466725"/>
-          </a:xfrm>
-          <a:prstGeom prst="ellipse">
-            <a:avLst/>
-          </a:prstGeom>
-        </p:spPr>
-        <p:style>
-          <a:lnRef idx="2">
-            <a:schemeClr val="accent6"/>
-          </a:lnRef>
-          <a:fillRef idx="1">
-            <a:schemeClr val="lt1"/>
-          </a:fillRef>
-          <a:effectRef idx="0">
-            <a:schemeClr val="accent6"/>
-          </a:effectRef>
-          <a:fontRef idx="minor">
-            <a:schemeClr val="dk1"/>
-          </a:fontRef>
-        </p:style>
-        <p:txBody>
-          <a:bodyPr lIns="0" tIns="0" rIns="0" bIns="0" rtlCol="0" anchor="ctr"/>
-          <a:lstStyle/>
-          <a:p>
-            <a:pPr algn="ctr"/>
-            <a:r>
-              <a:rPr lang="en-US" sz="1100" u="sng" dirty="0" smtClean="0"/>
-              <a:t>RName</a:t>
-            </a:r>
-            <a:endParaRPr lang="en-US" sz="1100" u="sng" dirty="0"/>
-          </a:p>
-        </p:txBody>
-      </p:sp>
-      <p:cxnSp>
-        <p:nvCxnSpPr>
-          <p:cNvPr id="64" name="Straight Connector 63"/>
-          <p:cNvCxnSpPr>
-            <a:stCxn id="55" idx="3"/>
-            <a:endCxn id="62" idx="2"/>
-          </p:cNvCxnSpPr>
-          <p:nvPr/>
-        </p:nvCxnSpPr>
-        <p:spPr>
-          <a:xfrm>
-            <a:off x="10287000" y="2817570"/>
-            <a:ext cx="590550" cy="2932"/>
-          </a:xfrm>
-          <a:prstGeom prst="line">
-            <a:avLst/>
-          </a:prstGeom>
-        </p:spPr>
-        <p:style>
-          <a:lnRef idx="1">
-            <a:schemeClr val="accent6"/>
-          </a:lnRef>
-          <a:fillRef idx="0">
-            <a:schemeClr val="accent6"/>
-          </a:fillRef>
-          <a:effectRef idx="0">
-            <a:schemeClr val="accent6"/>
-          </a:effectRef>
-          <a:fontRef idx="minor">
-            <a:schemeClr val="tx1"/>
-          </a:fontRef>
-        </p:style>
-      </p:cxnSp>
-      <p:sp>
-        <p:nvSpPr>
-          <p:cNvPr id="66" name="Rectangle 65"/>
-          <p:cNvSpPr/>
-          <p:nvPr/>
-        </p:nvSpPr>
-        <p:spPr>
-          <a:xfrm>
-            <a:off x="6188869" y="3665294"/>
-            <a:ext cx="1066800" cy="563806"/>
-          </a:xfrm>
-          <a:prstGeom prst="rect">
-            <a:avLst/>
-          </a:prstGeom>
-        </p:spPr>
-        <p:style>
-          <a:lnRef idx="2">
-            <a:schemeClr val="dk1"/>
-          </a:lnRef>
-          <a:fillRef idx="1">
-            <a:schemeClr val="lt1"/>
-          </a:fillRef>
-          <a:effectRef idx="0">
-            <a:schemeClr val="dk1"/>
-          </a:effectRef>
-          <a:fontRef idx="minor">
-            <a:schemeClr val="dk1"/>
-          </a:fontRef>
-        </p:style>
-        <p:txBody>
-          <a:bodyPr rtlCol="0" anchor="ctr"/>
-          <a:lstStyle/>
-          <a:p>
-            <a:pPr algn="ctr"/>
-            <a:r>
-              <a:rPr lang="en-US" dirty="0" smtClean="0"/>
-              <a:t>Battle</a:t>
-            </a:r>
-            <a:endParaRPr lang="en-US" dirty="0"/>
-          </a:p>
-        </p:txBody>
-      </p:sp>
-      <p:sp>
-        <p:nvSpPr>
-          <p:cNvPr id="67" name="Diamond 66"/>
-          <p:cNvSpPr/>
-          <p:nvPr/>
-        </p:nvSpPr>
-        <p:spPr>
-          <a:xfrm>
-            <a:off x="6496049" y="2228984"/>
-            <a:ext cx="942976" cy="853082"/>
-          </a:xfrm>
-          <a:prstGeom prst="diamond">
-            <a:avLst/>
-          </a:prstGeom>
-        </p:spPr>
-        <p:style>
-          <a:lnRef idx="2">
-            <a:schemeClr val="accent2"/>
-          </a:lnRef>
-          <a:fillRef idx="1">
-            <a:schemeClr val="lt1"/>
-          </a:fillRef>
-          <a:effectRef idx="0">
-            <a:schemeClr val="accent2"/>
-          </a:effectRef>
-          <a:fontRef idx="minor">
-            <a:schemeClr val="dk1"/>
-          </a:fontRef>
-        </p:style>
-        <p:txBody>
-          <a:bodyPr lIns="0" tIns="0" rIns="0" bIns="0" rtlCol="0" anchor="ctr"/>
-          <a:lstStyle/>
-          <a:p>
-            <a:pPr algn="ctr"/>
-            <a:r>
-              <a:rPr lang="en-US" sz="1050" dirty="0" smtClean="0"/>
-              <a:t>Partakes in</a:t>
-            </a:r>
-            <a:endParaRPr lang="en-US" sz="1050" dirty="0"/>
-          </a:p>
-        </p:txBody>
-      </p:sp>
-      <p:cxnSp>
-        <p:nvCxnSpPr>
-          <p:cNvPr id="69" name="Straight Connector 68"/>
-          <p:cNvCxnSpPr/>
-          <p:nvPr/>
-        </p:nvCxnSpPr>
-        <p:spPr>
-          <a:xfrm flipH="1">
-            <a:off x="7162800" y="1710025"/>
-            <a:ext cx="361950" cy="664513"/>
-          </a:xfrm>
-          <a:prstGeom prst="line">
-            <a:avLst/>
-          </a:prstGeom>
-        </p:spPr>
-        <p:style>
-          <a:lnRef idx="1">
-            <a:schemeClr val="accent2"/>
-          </a:lnRef>
-          <a:fillRef idx="0">
-            <a:schemeClr val="accent2"/>
-          </a:fillRef>
-          <a:effectRef idx="0">
-            <a:schemeClr val="accent2"/>
-          </a:effectRef>
-          <a:fontRef idx="minor">
-            <a:schemeClr val="tx1"/>
-          </a:fontRef>
-        </p:style>
-      </p:cxnSp>
-      <p:cxnSp>
-        <p:nvCxnSpPr>
-          <p:cNvPr id="71" name="Straight Connector 70"/>
-          <p:cNvCxnSpPr>
-            <a:endCxn id="66" idx="0"/>
-          </p:cNvCxnSpPr>
-          <p:nvPr/>
-        </p:nvCxnSpPr>
-        <p:spPr>
-          <a:xfrm flipH="1">
-            <a:off x="6722269" y="2936513"/>
-            <a:ext cx="69056" cy="728781"/>
-          </a:xfrm>
-          <a:prstGeom prst="line">
-            <a:avLst/>
-          </a:prstGeom>
-        </p:spPr>
-        <p:style>
-          <a:lnRef idx="1">
-            <a:schemeClr val="accent2"/>
-          </a:lnRef>
-          <a:fillRef idx="0">
-            <a:schemeClr val="accent2"/>
-          </a:fillRef>
-          <a:effectRef idx="0">
-            <a:schemeClr val="accent2"/>
-          </a:effectRef>
-          <a:fontRef idx="minor">
-            <a:schemeClr val="tx1"/>
-          </a:fontRef>
-        </p:style>
-      </p:cxnSp>
-      <p:sp>
-        <p:nvSpPr>
-          <p:cNvPr id="72" name="Diamond 71"/>
-          <p:cNvSpPr/>
-          <p:nvPr/>
-        </p:nvSpPr>
-        <p:spPr>
-          <a:xfrm>
-            <a:off x="7893844" y="3150169"/>
-            <a:ext cx="857249" cy="798142"/>
-          </a:xfrm>
-          <a:prstGeom prst="diamond">
-            <a:avLst/>
-          </a:prstGeom>
-        </p:spPr>
-        <p:style>
-          <a:lnRef idx="2">
-            <a:schemeClr val="accent2"/>
-          </a:lnRef>
-          <a:fillRef idx="1">
-            <a:schemeClr val="lt1"/>
-          </a:fillRef>
-          <a:effectRef idx="0">
-            <a:schemeClr val="accent2"/>
-          </a:effectRef>
-          <a:fontRef idx="minor">
-            <a:schemeClr val="dk1"/>
-          </a:fontRef>
-        </p:style>
-        <p:txBody>
-          <a:bodyPr lIns="0" rIns="0" rtlCol="0" anchor="ctr"/>
-          <a:lstStyle/>
-          <a:p>
-            <a:pPr algn="ctr"/>
-            <a:r>
-              <a:rPr lang="en-US" sz="1000" dirty="0" smtClean="0"/>
-              <a:t>Takes place in</a:t>
-            </a:r>
-            <a:endParaRPr lang="en-US" sz="1000" dirty="0"/>
-          </a:p>
-        </p:txBody>
-      </p:sp>
-      <p:cxnSp>
-        <p:nvCxnSpPr>
-          <p:cNvPr id="74" name="Straight Connector 73"/>
-          <p:cNvCxnSpPr/>
-          <p:nvPr/>
-        </p:nvCxnSpPr>
-        <p:spPr>
-          <a:xfrm flipV="1">
-            <a:off x="7255669" y="3717254"/>
-            <a:ext cx="812006" cy="281903"/>
-          </a:xfrm>
-          <a:prstGeom prst="line">
-            <a:avLst/>
-          </a:prstGeom>
-        </p:spPr>
-        <p:style>
-          <a:lnRef idx="1">
-            <a:schemeClr val="accent2"/>
-          </a:lnRef>
-          <a:fillRef idx="0">
-            <a:schemeClr val="accent2"/>
-          </a:fillRef>
-          <a:effectRef idx="0">
-            <a:schemeClr val="accent2"/>
-          </a:effectRef>
-          <a:fontRef idx="minor">
-            <a:schemeClr val="tx1"/>
-          </a:fontRef>
-        </p:style>
-      </p:cxnSp>
-      <p:cxnSp>
-        <p:nvCxnSpPr>
-          <p:cNvPr id="77" name="Straight Connector 76"/>
-          <p:cNvCxnSpPr>
-            <a:endCxn id="55" idx="1"/>
-          </p:cNvCxnSpPr>
-          <p:nvPr/>
-        </p:nvCxnSpPr>
-        <p:spPr>
-          <a:xfrm flipV="1">
-            <a:off x="8447188" y="2817570"/>
-            <a:ext cx="847725" cy="483333"/>
-          </a:xfrm>
-          <a:prstGeom prst="line">
-            <a:avLst/>
-          </a:prstGeom>
-        </p:spPr>
-        <p:style>
-          <a:lnRef idx="1">
-            <a:schemeClr val="accent2"/>
-          </a:lnRef>
-          <a:fillRef idx="0">
-            <a:schemeClr val="accent2"/>
-          </a:fillRef>
-          <a:effectRef idx="0">
-            <a:schemeClr val="accent2"/>
-          </a:effectRef>
-          <a:fontRef idx="minor">
-            <a:schemeClr val="tx1"/>
-          </a:fontRef>
-        </p:style>
-      </p:cxnSp>
-      <p:sp>
-        <p:nvSpPr>
-          <p:cNvPr id="85" name="Rectangle 84"/>
-          <p:cNvSpPr/>
-          <p:nvPr/>
-        </p:nvSpPr>
-        <p:spPr>
-          <a:xfrm>
-            <a:off x="2476500" y="4333988"/>
-            <a:ext cx="1831426" cy="676275"/>
-          </a:xfrm>
-          <a:prstGeom prst="rect">
-            <a:avLst/>
-          </a:prstGeom>
-        </p:spPr>
-        <p:style>
-          <a:lnRef idx="2">
-            <a:schemeClr val="dk1"/>
-          </a:lnRef>
-          <a:fillRef idx="1">
-            <a:schemeClr val="lt1"/>
-          </a:fillRef>
-          <a:effectRef idx="0">
-            <a:schemeClr val="dk1"/>
-          </a:effectRef>
-          <a:fontRef idx="minor">
-            <a:schemeClr val="dk1"/>
-          </a:fontRef>
-        </p:style>
-        <p:txBody>
-          <a:bodyPr rtlCol="0" anchor="ctr"/>
-          <a:lstStyle/>
-          <a:p>
-            <a:pPr algn="ctr"/>
-            <a:r>
-              <a:rPr lang="en-US" dirty="0" smtClean="0"/>
-              <a:t>Episode</a:t>
-            </a:r>
-            <a:endParaRPr lang="en-US" dirty="0"/>
-          </a:p>
-        </p:txBody>
-      </p:sp>
-      <p:sp>
-        <p:nvSpPr>
-          <p:cNvPr id="86" name="Diamond 85"/>
-          <p:cNvSpPr/>
-          <p:nvPr/>
-        </p:nvSpPr>
-        <p:spPr>
-          <a:xfrm>
-            <a:off x="2405691" y="2853970"/>
-            <a:ext cx="833722" cy="728709"/>
-          </a:xfrm>
-          <a:prstGeom prst="diamond">
-            <a:avLst/>
-          </a:prstGeom>
-        </p:spPr>
-        <p:style>
-          <a:lnRef idx="2">
-            <a:schemeClr val="accent2"/>
-          </a:lnRef>
-          <a:fillRef idx="1">
-            <a:schemeClr val="lt1"/>
-          </a:fillRef>
-          <a:effectRef idx="0">
-            <a:schemeClr val="accent2"/>
-          </a:effectRef>
-          <a:fontRef idx="minor">
-            <a:schemeClr val="dk1"/>
-          </a:fontRef>
-        </p:style>
-        <p:txBody>
-          <a:bodyPr lIns="0" tIns="0" rIns="0" bIns="0" rtlCol="0" anchor="ctr"/>
-          <a:lstStyle/>
-          <a:p>
-            <a:pPr algn="ctr"/>
-            <a:r>
-              <a:rPr lang="en-US" sz="950" dirty="0" smtClean="0"/>
-              <a:t>Appears</a:t>
-            </a:r>
-            <a:endParaRPr lang="en-US" sz="950" dirty="0"/>
-          </a:p>
-        </p:txBody>
-      </p:sp>
-      <p:sp>
-        <p:nvSpPr>
-          <p:cNvPr id="87" name="Diamond 86"/>
-          <p:cNvSpPr/>
-          <p:nvPr/>
-        </p:nvSpPr>
-        <p:spPr>
-          <a:xfrm>
-            <a:off x="3375896" y="2863264"/>
-            <a:ext cx="833722" cy="728709"/>
-          </a:xfrm>
-          <a:prstGeom prst="diamond">
-            <a:avLst/>
-          </a:prstGeom>
-        </p:spPr>
-        <p:style>
-          <a:lnRef idx="2">
-            <a:schemeClr val="accent2"/>
-          </a:lnRef>
-          <a:fillRef idx="1">
-            <a:schemeClr val="lt1"/>
-          </a:fillRef>
-          <a:effectRef idx="0">
-            <a:schemeClr val="accent2"/>
-          </a:effectRef>
-          <a:fontRef idx="minor">
-            <a:schemeClr val="dk1"/>
-          </a:fontRef>
-        </p:style>
-        <p:txBody>
-          <a:bodyPr lIns="0" tIns="0" rIns="0" bIns="0" rtlCol="0" anchor="ctr"/>
-          <a:lstStyle/>
-          <a:p>
-            <a:pPr algn="ctr"/>
-            <a:r>
-              <a:rPr lang="en-US" sz="1100" dirty="0" smtClean="0"/>
-              <a:t>Dies</a:t>
-            </a:r>
-            <a:endParaRPr lang="en-US" sz="950" dirty="0"/>
-          </a:p>
-        </p:txBody>
-      </p:sp>
-      <p:cxnSp>
-        <p:nvCxnSpPr>
-          <p:cNvPr id="89" name="Straight Connector 88"/>
-          <p:cNvCxnSpPr>
-            <a:endCxn id="86" idx="0"/>
-          </p:cNvCxnSpPr>
-          <p:nvPr/>
-        </p:nvCxnSpPr>
-        <p:spPr>
-          <a:xfrm>
-            <a:off x="2820742" y="1719197"/>
-            <a:ext cx="1810" cy="1134773"/>
-          </a:xfrm>
-          <a:prstGeom prst="line">
-            <a:avLst/>
-          </a:prstGeom>
-        </p:spPr>
-        <p:style>
-          <a:lnRef idx="1">
-            <a:schemeClr val="accent2"/>
-          </a:lnRef>
-          <a:fillRef idx="0">
-            <a:schemeClr val="accent2"/>
-          </a:fillRef>
-          <a:effectRef idx="0">
-            <a:schemeClr val="accent2"/>
-          </a:effectRef>
-          <a:fontRef idx="minor">
-            <a:schemeClr val="tx1"/>
-          </a:fontRef>
-        </p:style>
-      </p:cxnSp>
-      <p:cxnSp>
-        <p:nvCxnSpPr>
-          <p:cNvPr id="92" name="Straight Connector 91"/>
-          <p:cNvCxnSpPr>
-            <a:endCxn id="87" idx="0"/>
-          </p:cNvCxnSpPr>
-          <p:nvPr/>
-        </p:nvCxnSpPr>
-        <p:spPr>
-          <a:xfrm>
-            <a:off x="3581408" y="1719258"/>
-            <a:ext cx="211349" cy="1144006"/>
-          </a:xfrm>
-          <a:prstGeom prst="line">
-            <a:avLst/>
-          </a:prstGeom>
-        </p:spPr>
-        <p:style>
-          <a:lnRef idx="1">
-            <a:schemeClr val="accent2"/>
-          </a:lnRef>
-          <a:fillRef idx="0">
-            <a:schemeClr val="accent2"/>
-          </a:fillRef>
-          <a:effectRef idx="0">
-            <a:schemeClr val="accent2"/>
-          </a:effectRef>
-          <a:fontRef idx="minor">
-            <a:schemeClr val="tx1"/>
-          </a:fontRef>
-        </p:style>
-      </p:cxnSp>
-      <p:cxnSp>
-        <p:nvCxnSpPr>
-          <p:cNvPr id="94" name="Straight Connector 93"/>
-          <p:cNvCxnSpPr>
-            <a:stCxn id="86" idx="2"/>
-          </p:cNvCxnSpPr>
-          <p:nvPr/>
-        </p:nvCxnSpPr>
-        <p:spPr>
-          <a:xfrm flipH="1">
-            <a:off x="2820742" y="3582679"/>
-            <a:ext cx="1810" cy="763853"/>
-          </a:xfrm>
-          <a:prstGeom prst="line">
-            <a:avLst/>
-          </a:prstGeom>
-        </p:spPr>
-        <p:style>
-          <a:lnRef idx="1">
-            <a:schemeClr val="accent2"/>
-          </a:lnRef>
-          <a:fillRef idx="0">
-            <a:schemeClr val="accent2"/>
-          </a:fillRef>
-          <a:effectRef idx="0">
-            <a:schemeClr val="accent2"/>
-          </a:effectRef>
-          <a:fontRef idx="minor">
-            <a:schemeClr val="tx1"/>
-          </a:fontRef>
-        </p:style>
-      </p:cxnSp>
-      <p:cxnSp>
-        <p:nvCxnSpPr>
-          <p:cNvPr id="96" name="Straight Connector 95"/>
-          <p:cNvCxnSpPr>
-            <a:stCxn id="87" idx="2"/>
-          </p:cNvCxnSpPr>
-          <p:nvPr/>
-        </p:nvCxnSpPr>
-        <p:spPr>
-          <a:xfrm>
-            <a:off x="3792757" y="3591973"/>
-            <a:ext cx="0" cy="754559"/>
-          </a:xfrm>
-          <a:prstGeom prst="line">
-            <a:avLst/>
-          </a:prstGeom>
-        </p:spPr>
-        <p:style>
-          <a:lnRef idx="1">
-            <a:schemeClr val="accent2"/>
-          </a:lnRef>
-          <a:fillRef idx="0">
-            <a:schemeClr val="accent2"/>
-          </a:fillRef>
-          <a:effectRef idx="0">
-            <a:schemeClr val="accent2"/>
-          </a:effectRef>
-          <a:fontRef idx="minor">
-            <a:schemeClr val="tx1"/>
-          </a:fontRef>
-        </p:style>
-      </p:cxnSp>
-      <p:sp>
-        <p:nvSpPr>
-          <p:cNvPr id="97" name="Oval 96"/>
-          <p:cNvSpPr/>
-          <p:nvPr/>
-        </p:nvSpPr>
-        <p:spPr>
-          <a:xfrm>
-            <a:off x="750684" y="4402889"/>
-            <a:ext cx="827419" cy="538471"/>
-          </a:xfrm>
-          <a:prstGeom prst="ellipse">
-            <a:avLst/>
-          </a:prstGeom>
-        </p:spPr>
-        <p:style>
-          <a:lnRef idx="2">
-            <a:schemeClr val="accent6"/>
-          </a:lnRef>
-          <a:fillRef idx="1">
-            <a:schemeClr val="lt1"/>
-          </a:fillRef>
-          <a:effectRef idx="0">
-            <a:schemeClr val="accent6"/>
-          </a:effectRef>
-          <a:fontRef idx="minor">
-            <a:schemeClr val="dk1"/>
-          </a:fontRef>
-        </p:style>
-        <p:txBody>
-          <a:bodyPr rtlCol="0" anchor="ctr"/>
-          <a:lstStyle/>
-          <a:p>
-            <a:pPr algn="ctr"/>
-            <a:r>
-              <a:rPr lang="en-US" u="sng" dirty="0" smtClean="0"/>
-              <a:t>EID</a:t>
-            </a:r>
-            <a:endParaRPr lang="en-US" u="sng" dirty="0"/>
-          </a:p>
-        </p:txBody>
-      </p:sp>
-      <p:cxnSp>
-        <p:nvCxnSpPr>
-          <p:cNvPr id="99" name="Straight Connector 98"/>
-          <p:cNvCxnSpPr>
-            <a:stCxn id="97" idx="6"/>
-            <a:endCxn id="85" idx="1"/>
-          </p:cNvCxnSpPr>
-          <p:nvPr/>
-        </p:nvCxnSpPr>
-        <p:spPr>
-          <a:xfrm>
-            <a:off x="1578103" y="4672125"/>
-            <a:ext cx="898397" cy="1"/>
-          </a:xfrm>
-          <a:prstGeom prst="line">
-            <a:avLst/>
-          </a:prstGeom>
-        </p:spPr>
-        <p:style>
-          <a:lnRef idx="1">
-            <a:schemeClr val="accent6"/>
-          </a:lnRef>
-          <a:fillRef idx="0">
-            <a:schemeClr val="accent6"/>
-          </a:fillRef>
-          <a:effectRef idx="0">
-            <a:schemeClr val="accent6"/>
-          </a:effectRef>
-          <a:fontRef idx="minor">
-            <a:schemeClr val="tx1"/>
-          </a:fontRef>
-        </p:style>
-      </p:cxnSp>
-      <p:sp>
-        <p:nvSpPr>
-          <p:cNvPr id="101" name="Oval 100"/>
-          <p:cNvSpPr/>
-          <p:nvPr/>
-        </p:nvSpPr>
-        <p:spPr>
-          <a:xfrm>
-            <a:off x="1160337" y="5279497"/>
-            <a:ext cx="915747" cy="613775"/>
-          </a:xfrm>
-          <a:prstGeom prst="ellipse">
-            <a:avLst/>
-          </a:prstGeom>
-        </p:spPr>
-        <p:style>
-          <a:lnRef idx="2">
-            <a:schemeClr val="accent6"/>
-          </a:lnRef>
-          <a:fillRef idx="1">
-            <a:schemeClr val="lt1"/>
-          </a:fillRef>
-          <a:effectRef idx="0">
-            <a:schemeClr val="accent6"/>
-          </a:effectRef>
-          <a:fontRef idx="minor">
-            <a:schemeClr val="dk1"/>
-          </a:fontRef>
-        </p:style>
-        <p:txBody>
-          <a:bodyPr lIns="0" rIns="0" rtlCol="0" anchor="ctr"/>
-          <a:lstStyle/>
-          <a:p>
-            <a:pPr algn="ctr"/>
-            <a:r>
-              <a:rPr lang="en-US" sz="1600" dirty="0" smtClean="0"/>
-              <a:t>Season</a:t>
-            </a:r>
-            <a:endParaRPr lang="en-US" sz="1600" dirty="0"/>
-          </a:p>
-        </p:txBody>
-      </p:sp>
-      <p:cxnSp>
-        <p:nvCxnSpPr>
-          <p:cNvPr id="103" name="Straight Connector 102"/>
-          <p:cNvCxnSpPr>
-            <a:stCxn id="101" idx="7"/>
-          </p:cNvCxnSpPr>
-          <p:nvPr/>
-        </p:nvCxnSpPr>
-        <p:spPr>
-          <a:xfrm flipV="1">
-            <a:off x="1941976" y="4941360"/>
-            <a:ext cx="534524" cy="428022"/>
-          </a:xfrm>
-          <a:prstGeom prst="line">
-            <a:avLst/>
-          </a:prstGeom>
-        </p:spPr>
-        <p:style>
-          <a:lnRef idx="1">
-            <a:schemeClr val="accent6"/>
-          </a:lnRef>
-          <a:fillRef idx="0">
-            <a:schemeClr val="accent6"/>
-          </a:fillRef>
-          <a:effectRef idx="0">
-            <a:schemeClr val="accent6"/>
-          </a:effectRef>
-          <a:fontRef idx="minor">
-            <a:schemeClr val="tx1"/>
-          </a:fontRef>
-        </p:style>
-      </p:cxnSp>
-      <p:sp>
-        <p:nvSpPr>
-          <p:cNvPr id="104" name="Diamond 103"/>
-          <p:cNvSpPr/>
-          <p:nvPr/>
-        </p:nvSpPr>
-        <p:spPr>
-          <a:xfrm>
-            <a:off x="4869405" y="3904907"/>
-            <a:ext cx="845031" cy="767217"/>
-          </a:xfrm>
-          <a:prstGeom prst="diamond">
-            <a:avLst/>
-          </a:prstGeom>
-        </p:spPr>
-        <p:style>
-          <a:lnRef idx="2">
-            <a:schemeClr val="accent2"/>
-          </a:lnRef>
-          <a:fillRef idx="1">
-            <a:schemeClr val="lt1"/>
-          </a:fillRef>
-          <a:effectRef idx="0">
-            <a:schemeClr val="accent2"/>
-          </a:effectRef>
-          <a:fontRef idx="minor">
-            <a:schemeClr val="dk1"/>
-          </a:fontRef>
-        </p:style>
-        <p:txBody>
-          <a:bodyPr lIns="0" tIns="0" rIns="0" bIns="0" rtlCol="0" anchor="ctr"/>
-          <a:lstStyle/>
-          <a:p>
-            <a:pPr algn="ctr"/>
-            <a:r>
-              <a:rPr lang="en-US" sz="1600" dirty="0" smtClean="0"/>
-              <a:t>Has</a:t>
-            </a:r>
-            <a:endParaRPr lang="en-US" dirty="0"/>
-          </a:p>
-        </p:txBody>
-      </p:sp>
-      <p:cxnSp>
-        <p:nvCxnSpPr>
-          <p:cNvPr id="106" name="Straight Connector 105"/>
-          <p:cNvCxnSpPr/>
-          <p:nvPr/>
-        </p:nvCxnSpPr>
-        <p:spPr>
-          <a:xfrm flipV="1">
-            <a:off x="5550694" y="3866527"/>
-            <a:ext cx="650081" cy="281904"/>
-          </a:xfrm>
-          <a:prstGeom prst="line">
-            <a:avLst/>
-          </a:prstGeom>
-        </p:spPr>
-        <p:style>
-          <a:lnRef idx="1">
-            <a:schemeClr val="accent2"/>
-          </a:lnRef>
-          <a:fillRef idx="0">
-            <a:schemeClr val="accent2"/>
-          </a:fillRef>
-          <a:effectRef idx="0">
-            <a:schemeClr val="accent2"/>
-          </a:effectRef>
-          <a:fontRef idx="minor">
-            <a:schemeClr val="tx1"/>
-          </a:fontRef>
-        </p:style>
-      </p:cxnSp>
-      <p:cxnSp>
-        <p:nvCxnSpPr>
-          <p:cNvPr id="109" name="Straight Connector 108"/>
-          <p:cNvCxnSpPr/>
-          <p:nvPr/>
-        </p:nvCxnSpPr>
-        <p:spPr>
-          <a:xfrm flipV="1">
-            <a:off x="4292180" y="4402889"/>
-            <a:ext cx="705705" cy="314177"/>
-          </a:xfrm>
-          <a:prstGeom prst="line">
-            <a:avLst/>
-          </a:prstGeom>
-        </p:spPr>
-        <p:style>
-          <a:lnRef idx="1">
-            <a:schemeClr val="accent2"/>
-          </a:lnRef>
-          <a:fillRef idx="0">
-            <a:schemeClr val="accent2"/>
-          </a:fillRef>
-          <a:effectRef idx="0">
-            <a:schemeClr val="accent2"/>
-          </a:effectRef>
-          <a:fontRef idx="minor">
-            <a:schemeClr val="tx1"/>
-          </a:fontRef>
-        </p:style>
-      </p:cxnSp>
-      <p:cxnSp>
-        <p:nvCxnSpPr>
-          <p:cNvPr id="116" name="Straight Connector 115"/>
-          <p:cNvCxnSpPr>
-            <a:stCxn id="66" idx="3"/>
-          </p:cNvCxnSpPr>
-          <p:nvPr/>
-        </p:nvCxnSpPr>
-        <p:spPr>
-          <a:xfrm flipV="1">
-            <a:off x="7255669" y="3665294"/>
-            <a:ext cx="812006" cy="281903"/>
-          </a:xfrm>
-          <a:prstGeom prst="line">
-            <a:avLst/>
-          </a:prstGeom>
-        </p:spPr>
-        <p:style>
-          <a:lnRef idx="1">
-            <a:schemeClr val="accent2"/>
-          </a:lnRef>
-          <a:fillRef idx="0">
-            <a:schemeClr val="accent2"/>
-          </a:fillRef>
-          <a:effectRef idx="0">
-            <a:schemeClr val="accent2"/>
-          </a:effectRef>
-          <a:fontRef idx="minor">
-            <a:schemeClr val="tx1"/>
-          </a:fontRef>
-        </p:style>
-      </p:cxnSp>
-      <p:sp>
-        <p:nvSpPr>
-          <p:cNvPr id="117" name="Oval 116"/>
-          <p:cNvSpPr/>
-          <p:nvPr/>
-        </p:nvSpPr>
-        <p:spPr>
-          <a:xfrm>
-            <a:off x="7095306" y="4502601"/>
-            <a:ext cx="773163" cy="483247"/>
-          </a:xfrm>
-          <a:prstGeom prst="ellipse">
-            <a:avLst/>
-          </a:prstGeom>
-        </p:spPr>
-        <p:style>
-          <a:lnRef idx="2">
-            <a:schemeClr val="accent6"/>
-          </a:lnRef>
-          <a:fillRef idx="1">
-            <a:schemeClr val="lt1"/>
-          </a:fillRef>
-          <a:effectRef idx="0">
-            <a:schemeClr val="accent6"/>
-          </a:effectRef>
-          <a:fontRef idx="minor">
-            <a:schemeClr val="dk1"/>
-          </a:fontRef>
-        </p:style>
-        <p:txBody>
-          <a:bodyPr lIns="0" rIns="0" rtlCol="0" anchor="ctr"/>
-          <a:lstStyle/>
-          <a:p>
-            <a:pPr algn="ctr"/>
-            <a:r>
-              <a:rPr lang="en-US" sz="1400" u="sng" dirty="0" smtClean="0"/>
-              <a:t>Name</a:t>
-            </a:r>
-            <a:endParaRPr lang="en-US" sz="1400" u="sng" dirty="0"/>
-          </a:p>
-        </p:txBody>
-      </p:sp>
-      <p:cxnSp>
-        <p:nvCxnSpPr>
-          <p:cNvPr id="119" name="Straight Connector 118"/>
-          <p:cNvCxnSpPr/>
-          <p:nvPr/>
-        </p:nvCxnSpPr>
-        <p:spPr>
-          <a:xfrm>
-            <a:off x="7072313" y="4229100"/>
-            <a:ext cx="271462" cy="293619"/>
-          </a:xfrm>
-          <a:prstGeom prst="line">
-            <a:avLst/>
-          </a:prstGeom>
-        </p:spPr>
-        <p:style>
-          <a:lnRef idx="1">
-            <a:schemeClr val="accent6"/>
-          </a:lnRef>
-          <a:fillRef idx="0">
-            <a:schemeClr val="accent6"/>
-          </a:fillRef>
-          <a:effectRef idx="0">
-            <a:schemeClr val="accent6"/>
-          </a:effectRef>
-          <a:fontRef idx="minor">
-            <a:schemeClr val="tx1"/>
-          </a:fontRef>
-        </p:style>
-      </p:cxnSp>
+              </a:endParaRPr>
+            </a:p>
+          </p:txBody>
+        </p:sp>
+        <p:sp>
+          <p:nvSpPr>
+            <p:cNvPr id="6" name="Oval 5"/>
+            <p:cNvSpPr/>
+            <p:nvPr/>
+          </p:nvSpPr>
+          <p:spPr>
+            <a:xfrm>
+              <a:off x="3098321" y="809161"/>
+              <a:ext cx="681487" cy="457200"/>
+            </a:xfrm>
+            <a:prstGeom prst="ellipse">
+              <a:avLst/>
+            </a:prstGeom>
+            <a:ln/>
+          </p:spPr>
+          <p:style>
+            <a:lnRef idx="2">
+              <a:schemeClr val="accent6"/>
+            </a:lnRef>
+            <a:fillRef idx="1">
+              <a:schemeClr val="lt1"/>
+            </a:fillRef>
+            <a:effectRef idx="0">
+              <a:schemeClr val="accent6"/>
+            </a:effectRef>
+            <a:fontRef idx="minor">
+              <a:schemeClr val="dk1"/>
+            </a:fontRef>
+          </p:style>
+          <p:txBody>
+            <a:bodyPr lIns="0" tIns="0" rIns="0" bIns="0" rtlCol="0" anchor="ctr"/>
+            <a:lstStyle/>
+            <a:p>
+              <a:pPr algn="ctr"/>
+              <a:r>
+                <a:rPr lang="en-US" sz="1200" dirty="0" smtClean="0"/>
+                <a:t>Name</a:t>
+              </a:r>
+              <a:endParaRPr lang="en-US" sz="1100" dirty="0"/>
+            </a:p>
+          </p:txBody>
+        </p:sp>
+        <p:cxnSp>
+          <p:nvCxnSpPr>
+            <p:cNvPr id="8" name="Straight Connector 7"/>
+            <p:cNvCxnSpPr>
+              <a:stCxn id="5" idx="4"/>
+            </p:cNvCxnSpPr>
+            <p:nvPr/>
+          </p:nvCxnSpPr>
+          <p:spPr>
+            <a:xfrm>
+              <a:off x="2669157" y="1266361"/>
+              <a:ext cx="102258" cy="424131"/>
+            </a:xfrm>
+            <a:prstGeom prst="line">
+              <a:avLst/>
+            </a:prstGeom>
+          </p:spPr>
+          <p:style>
+            <a:lnRef idx="1">
+              <a:schemeClr val="accent6"/>
+            </a:lnRef>
+            <a:fillRef idx="0">
+              <a:schemeClr val="accent6"/>
+            </a:fillRef>
+            <a:effectRef idx="0">
+              <a:schemeClr val="accent6"/>
+            </a:effectRef>
+            <a:fontRef idx="minor">
+              <a:schemeClr val="tx1"/>
+            </a:fontRef>
+          </p:style>
+        </p:cxnSp>
+        <p:cxnSp>
+          <p:nvCxnSpPr>
+            <p:cNvPr id="10" name="Straight Connector 9"/>
+            <p:cNvCxnSpPr>
+              <a:stCxn id="6" idx="4"/>
+            </p:cNvCxnSpPr>
+            <p:nvPr/>
+          </p:nvCxnSpPr>
+          <p:spPr>
+            <a:xfrm flipH="1">
+              <a:off x="3288099" y="1266361"/>
+              <a:ext cx="150966" cy="424131"/>
+            </a:xfrm>
+            <a:prstGeom prst="line">
+              <a:avLst/>
+            </a:prstGeom>
+          </p:spPr>
+          <p:style>
+            <a:lnRef idx="1">
+              <a:schemeClr val="accent6"/>
+            </a:lnRef>
+            <a:fillRef idx="0">
+              <a:schemeClr val="accent6"/>
+            </a:fillRef>
+            <a:effectRef idx="0">
+              <a:schemeClr val="accent6"/>
+            </a:effectRef>
+            <a:fontRef idx="minor">
+              <a:schemeClr val="tx1"/>
+            </a:fontRef>
+          </p:style>
+        </p:cxnSp>
+        <p:sp>
+          <p:nvSpPr>
+            <p:cNvPr id="11" name="Diamond 10"/>
+            <p:cNvSpPr/>
+            <p:nvPr/>
+          </p:nvSpPr>
+          <p:spPr>
+            <a:xfrm>
+              <a:off x="848626" y="1487337"/>
+              <a:ext cx="1057275" cy="1022607"/>
+            </a:xfrm>
+            <a:prstGeom prst="diamond">
+              <a:avLst/>
+            </a:prstGeom>
+          </p:spPr>
+          <p:style>
+            <a:lnRef idx="2">
+              <a:schemeClr val="accent2"/>
+            </a:lnRef>
+            <a:fillRef idx="1">
+              <a:schemeClr val="lt1"/>
+            </a:fillRef>
+            <a:effectRef idx="0">
+              <a:schemeClr val="accent2"/>
+            </a:effectRef>
+            <a:fontRef idx="minor">
+              <a:schemeClr val="dk1"/>
+            </a:fontRef>
+          </p:style>
+          <p:txBody>
+            <a:bodyPr lIns="0" tIns="0" rIns="0" bIns="0" rtlCol="0" anchor="ctr"/>
+            <a:lstStyle/>
+            <a:p>
+              <a:pPr algn="ctr"/>
+              <a:r>
+                <a:rPr lang="en-US" sz="1200" dirty="0" smtClean="0"/>
+                <a:t>Related to</a:t>
+              </a:r>
+              <a:endParaRPr lang="en-US" sz="1200" dirty="0"/>
+            </a:p>
+          </p:txBody>
+        </p:sp>
+        <p:sp>
+          <p:nvSpPr>
+            <p:cNvPr id="20" name="Arc 19"/>
+            <p:cNvSpPr/>
+            <p:nvPr/>
+          </p:nvSpPr>
+          <p:spPr>
+            <a:xfrm>
+              <a:off x="1505394" y="1487336"/>
+              <a:ext cx="1107061" cy="1022607"/>
+            </a:xfrm>
+            <a:prstGeom prst="arc">
+              <a:avLst>
+                <a:gd name="adj1" fmla="val 12646492"/>
+                <a:gd name="adj2" fmla="val 20261718"/>
+              </a:avLst>
+            </a:prstGeom>
+          </p:spPr>
+          <p:style>
+            <a:lnRef idx="1">
+              <a:schemeClr val="accent2"/>
+            </a:lnRef>
+            <a:fillRef idx="0">
+              <a:schemeClr val="accent2"/>
+            </a:fillRef>
+            <a:effectRef idx="0">
+              <a:schemeClr val="accent2"/>
+            </a:effectRef>
+            <a:fontRef idx="minor">
+              <a:schemeClr val="tx1"/>
+            </a:fontRef>
+          </p:style>
+          <p:txBody>
+            <a:bodyPr rtlCol="0" anchor="ctr"/>
+            <a:lstStyle/>
+            <a:p>
+              <a:pPr algn="ctr"/>
+              <a:endParaRPr lang="en-US"/>
+            </a:p>
+          </p:txBody>
+        </p:sp>
+        <p:sp>
+          <p:nvSpPr>
+            <p:cNvPr id="22" name="Arc 21"/>
+            <p:cNvSpPr/>
+            <p:nvPr/>
+          </p:nvSpPr>
+          <p:spPr>
+            <a:xfrm rot="9536355">
+              <a:off x="1498163" y="1556572"/>
+              <a:ext cx="1163582" cy="1105725"/>
+            </a:xfrm>
+            <a:prstGeom prst="arc">
+              <a:avLst>
+                <a:gd name="adj1" fmla="val 13183303"/>
+                <a:gd name="adj2" fmla="val 21348145"/>
+              </a:avLst>
+            </a:prstGeom>
+          </p:spPr>
+          <p:style>
+            <a:lnRef idx="1">
+              <a:schemeClr val="accent2"/>
+            </a:lnRef>
+            <a:fillRef idx="0">
+              <a:schemeClr val="accent2"/>
+            </a:fillRef>
+            <a:effectRef idx="0">
+              <a:schemeClr val="accent2"/>
+            </a:effectRef>
+            <a:fontRef idx="minor">
+              <a:schemeClr val="tx1"/>
+            </a:fontRef>
+          </p:style>
+          <p:txBody>
+            <a:bodyPr rtlCol="0" anchor="ctr"/>
+            <a:lstStyle/>
+            <a:p>
+              <a:pPr algn="ctr"/>
+              <a:endParaRPr lang="en-US"/>
+            </a:p>
+          </p:txBody>
+        </p:sp>
+        <p:sp>
+          <p:nvSpPr>
+            <p:cNvPr id="23" name="Oval 22"/>
+            <p:cNvSpPr/>
+            <p:nvPr/>
+          </p:nvSpPr>
+          <p:spPr>
+            <a:xfrm>
+              <a:off x="449832" y="1130420"/>
+              <a:ext cx="628650" cy="476250"/>
+            </a:xfrm>
+            <a:prstGeom prst="ellipse">
+              <a:avLst/>
+            </a:prstGeom>
+          </p:spPr>
+          <p:style>
+            <a:lnRef idx="2">
+              <a:schemeClr val="accent6"/>
+            </a:lnRef>
+            <a:fillRef idx="1">
+              <a:schemeClr val="lt1"/>
+            </a:fillRef>
+            <a:effectRef idx="0">
+              <a:schemeClr val="accent6"/>
+            </a:effectRef>
+            <a:fontRef idx="minor">
+              <a:schemeClr val="dk1"/>
+            </a:fontRef>
+          </p:style>
+          <p:txBody>
+            <a:bodyPr lIns="0" tIns="0" rIns="0" bIns="0" rtlCol="0" anchor="ctr"/>
+            <a:lstStyle/>
+            <a:p>
+              <a:pPr algn="ctr"/>
+              <a:r>
+                <a:rPr lang="en-US" sz="1400" dirty="0" smtClean="0"/>
+                <a:t>Type</a:t>
+              </a:r>
+              <a:endParaRPr lang="en-US" sz="1400" dirty="0"/>
+            </a:p>
+          </p:txBody>
+        </p:sp>
+        <p:cxnSp>
+          <p:nvCxnSpPr>
+            <p:cNvPr id="25" name="Straight Connector 24"/>
+            <p:cNvCxnSpPr>
+              <a:stCxn id="23" idx="5"/>
+            </p:cNvCxnSpPr>
+            <p:nvPr/>
+          </p:nvCxnSpPr>
+          <p:spPr>
+            <a:xfrm>
+              <a:off x="986418" y="1536925"/>
+              <a:ext cx="177789" cy="152594"/>
+            </a:xfrm>
+            <a:prstGeom prst="line">
+              <a:avLst/>
+            </a:prstGeom>
+          </p:spPr>
+          <p:style>
+            <a:lnRef idx="1">
+              <a:schemeClr val="accent6"/>
+            </a:lnRef>
+            <a:fillRef idx="0">
+              <a:schemeClr val="accent6"/>
+            </a:fillRef>
+            <a:effectRef idx="0">
+              <a:schemeClr val="accent6"/>
+            </a:effectRef>
+            <a:fontRef idx="minor">
+              <a:schemeClr val="tx1"/>
+            </a:fontRef>
+          </p:style>
+        </p:cxnSp>
+        <p:sp>
+          <p:nvSpPr>
+            <p:cNvPr id="26" name="Oval 25"/>
+            <p:cNvSpPr/>
+            <p:nvPr/>
+          </p:nvSpPr>
+          <p:spPr>
+            <a:xfrm>
+              <a:off x="3839717" y="814360"/>
+              <a:ext cx="813266" cy="516045"/>
+            </a:xfrm>
+            <a:prstGeom prst="ellipse">
+              <a:avLst/>
+            </a:prstGeom>
+          </p:spPr>
+          <p:style>
+            <a:lnRef idx="2">
+              <a:schemeClr val="accent6"/>
+            </a:lnRef>
+            <a:fillRef idx="1">
+              <a:schemeClr val="lt1"/>
+            </a:fillRef>
+            <a:effectRef idx="0">
+              <a:schemeClr val="accent6"/>
+            </a:effectRef>
+            <a:fontRef idx="minor">
+              <a:schemeClr val="dk1"/>
+            </a:fontRef>
+          </p:style>
+          <p:txBody>
+            <a:bodyPr rtlCol="0" anchor="ctr"/>
+            <a:lstStyle/>
+            <a:p>
+              <a:pPr algn="ctr"/>
+              <a:r>
+                <a:rPr lang="en-US" sz="1200" dirty="0" smtClean="0"/>
+                <a:t>Dead/Alive</a:t>
+              </a:r>
+              <a:endParaRPr lang="en-US" sz="1200" dirty="0"/>
+            </a:p>
+          </p:txBody>
+        </p:sp>
+        <p:cxnSp>
+          <p:nvCxnSpPr>
+            <p:cNvPr id="28" name="Straight Connector 27"/>
+            <p:cNvCxnSpPr/>
+            <p:nvPr/>
+          </p:nvCxnSpPr>
+          <p:spPr>
+            <a:xfrm flipV="1">
+              <a:off x="3894108" y="1298383"/>
+              <a:ext cx="201725" cy="391138"/>
+            </a:xfrm>
+            <a:prstGeom prst="line">
+              <a:avLst/>
+            </a:prstGeom>
+          </p:spPr>
+          <p:style>
+            <a:lnRef idx="1">
+              <a:schemeClr val="accent6"/>
+            </a:lnRef>
+            <a:fillRef idx="0">
+              <a:schemeClr val="accent6"/>
+            </a:fillRef>
+            <a:effectRef idx="0">
+              <a:schemeClr val="accent6"/>
+            </a:effectRef>
+            <a:fontRef idx="minor">
+              <a:schemeClr val="tx1"/>
+            </a:fontRef>
+          </p:style>
+        </p:cxnSp>
+        <p:sp>
+          <p:nvSpPr>
+            <p:cNvPr id="31" name="Oval 30"/>
+            <p:cNvSpPr/>
+            <p:nvPr/>
+          </p:nvSpPr>
+          <p:spPr>
+            <a:xfrm>
+              <a:off x="1841829" y="2952508"/>
+              <a:ext cx="827328" cy="561975"/>
+            </a:xfrm>
+            <a:prstGeom prst="ellipse">
+              <a:avLst/>
+            </a:prstGeom>
+          </p:spPr>
+          <p:style>
+            <a:lnRef idx="2">
+              <a:schemeClr val="accent6"/>
+            </a:lnRef>
+            <a:fillRef idx="1">
+              <a:schemeClr val="lt1"/>
+            </a:fillRef>
+            <a:effectRef idx="0">
+              <a:schemeClr val="accent6"/>
+            </a:effectRef>
+            <a:fontRef idx="minor">
+              <a:schemeClr val="dk1"/>
+            </a:fontRef>
+          </p:style>
+          <p:txBody>
+            <a:bodyPr rtlCol="0" anchor="ctr"/>
+            <a:lstStyle/>
+            <a:p>
+              <a:pPr algn="ctr"/>
+              <a:r>
+                <a:rPr lang="en-US" sz="1200" dirty="0" smtClean="0"/>
+                <a:t>Social Status</a:t>
+              </a:r>
+              <a:endParaRPr lang="en-US" sz="1200" dirty="0"/>
+            </a:p>
+          </p:txBody>
+        </p:sp>
+        <p:cxnSp>
+          <p:nvCxnSpPr>
+            <p:cNvPr id="33" name="Straight Connector 32"/>
+            <p:cNvCxnSpPr>
+              <a:stCxn id="31" idx="7"/>
+            </p:cNvCxnSpPr>
+            <p:nvPr/>
+          </p:nvCxnSpPr>
+          <p:spPr>
+            <a:xfrm flipV="1">
+              <a:off x="2547998" y="2287995"/>
+              <a:ext cx="273559" cy="746812"/>
+            </a:xfrm>
+            <a:prstGeom prst="line">
+              <a:avLst/>
+            </a:prstGeom>
+          </p:spPr>
+          <p:style>
+            <a:lnRef idx="1">
+              <a:schemeClr val="accent6"/>
+            </a:lnRef>
+            <a:fillRef idx="0">
+              <a:schemeClr val="accent6"/>
+            </a:fillRef>
+            <a:effectRef idx="0">
+              <a:schemeClr val="accent6"/>
+            </a:effectRef>
+            <a:fontRef idx="minor">
+              <a:schemeClr val="tx1"/>
+            </a:fontRef>
+          </p:style>
+        </p:cxnSp>
+        <p:sp>
+          <p:nvSpPr>
+            <p:cNvPr id="34" name="Diamond 33"/>
+            <p:cNvSpPr/>
+            <p:nvPr/>
+          </p:nvSpPr>
+          <p:spPr>
+            <a:xfrm>
+              <a:off x="5783832" y="1648094"/>
+              <a:ext cx="762000" cy="681325"/>
+            </a:xfrm>
+            <a:prstGeom prst="diamond">
+              <a:avLst/>
+            </a:prstGeom>
+          </p:spPr>
+          <p:style>
+            <a:lnRef idx="2">
+              <a:schemeClr val="accent2"/>
+            </a:lnRef>
+            <a:fillRef idx="1">
+              <a:schemeClr val="lt1"/>
+            </a:fillRef>
+            <a:effectRef idx="0">
+              <a:schemeClr val="accent2"/>
+            </a:effectRef>
+            <a:fontRef idx="minor">
+              <a:schemeClr val="dk1"/>
+            </a:fontRef>
+          </p:style>
+          <p:txBody>
+            <a:bodyPr lIns="0" tIns="0" rIns="0" bIns="0" rtlCol="0" anchor="ctr"/>
+            <a:lstStyle/>
+            <a:p>
+              <a:pPr algn="ctr"/>
+              <a:r>
+                <a:rPr lang="en-US" sz="1400" dirty="0" smtClean="0"/>
+                <a:t>Has</a:t>
+              </a:r>
+              <a:endParaRPr lang="en-US" sz="1400" dirty="0"/>
+            </a:p>
+          </p:txBody>
+        </p:sp>
+        <p:cxnSp>
+          <p:nvCxnSpPr>
+            <p:cNvPr id="36" name="Straight Connector 35"/>
+            <p:cNvCxnSpPr>
+              <a:stCxn id="4" idx="3"/>
+              <a:endCxn id="34" idx="1"/>
+            </p:cNvCxnSpPr>
+            <p:nvPr/>
+          </p:nvCxnSpPr>
+          <p:spPr>
+            <a:xfrm>
+              <a:off x="4100150" y="1988757"/>
+              <a:ext cx="1683682" cy="0"/>
+            </a:xfrm>
+            <a:prstGeom prst="line">
+              <a:avLst/>
+            </a:prstGeom>
+          </p:spPr>
+          <p:style>
+            <a:lnRef idx="1">
+              <a:schemeClr val="accent2"/>
+            </a:lnRef>
+            <a:fillRef idx="0">
+              <a:schemeClr val="accent2"/>
+            </a:fillRef>
+            <a:effectRef idx="0">
+              <a:schemeClr val="accent2"/>
+            </a:effectRef>
+            <a:fontRef idx="minor">
+              <a:schemeClr val="tx1"/>
+            </a:fontRef>
+          </p:style>
+        </p:cxnSp>
+        <p:sp>
+          <p:nvSpPr>
+            <p:cNvPr id="39" name="Rectangle 38"/>
+            <p:cNvSpPr/>
+            <p:nvPr/>
+          </p:nvSpPr>
+          <p:spPr>
+            <a:xfrm>
+              <a:off x="7679308" y="1689519"/>
+              <a:ext cx="933450" cy="598476"/>
+            </a:xfrm>
+            <a:prstGeom prst="rect">
+              <a:avLst/>
+            </a:prstGeom>
+          </p:spPr>
+          <p:style>
+            <a:lnRef idx="2">
+              <a:schemeClr val="dk1"/>
+            </a:lnRef>
+            <a:fillRef idx="1">
+              <a:schemeClr val="lt1"/>
+            </a:fillRef>
+            <a:effectRef idx="0">
+              <a:schemeClr val="dk1"/>
+            </a:effectRef>
+            <a:fontRef idx="minor">
+              <a:schemeClr val="dk1"/>
+            </a:fontRef>
+          </p:style>
+          <p:txBody>
+            <a:bodyPr rtlCol="0" anchor="ctr"/>
+            <a:lstStyle/>
+            <a:p>
+              <a:pPr algn="ctr"/>
+              <a:r>
+                <a:rPr lang="en-US" dirty="0" smtClean="0"/>
+                <a:t>House</a:t>
+              </a:r>
+              <a:endParaRPr lang="en-US" dirty="0"/>
+            </a:p>
+          </p:txBody>
+        </p:sp>
+        <p:cxnSp>
+          <p:nvCxnSpPr>
+            <p:cNvPr id="41" name="Straight Connector 40"/>
+            <p:cNvCxnSpPr/>
+            <p:nvPr/>
+          </p:nvCxnSpPr>
+          <p:spPr>
+            <a:xfrm>
+              <a:off x="6450582" y="1901945"/>
+              <a:ext cx="1228726" cy="10612"/>
+            </a:xfrm>
+            <a:prstGeom prst="line">
+              <a:avLst/>
+            </a:prstGeom>
+          </p:spPr>
+          <p:style>
+            <a:lnRef idx="1">
+              <a:schemeClr val="accent2"/>
+            </a:lnRef>
+            <a:fillRef idx="0">
+              <a:schemeClr val="accent2"/>
+            </a:fillRef>
+            <a:effectRef idx="0">
+              <a:schemeClr val="accent2"/>
+            </a:effectRef>
+            <a:fontRef idx="minor">
+              <a:schemeClr val="tx1"/>
+            </a:fontRef>
+          </p:style>
+        </p:cxnSp>
+        <p:cxnSp>
+          <p:nvCxnSpPr>
+            <p:cNvPr id="43" name="Straight Connector 42"/>
+            <p:cNvCxnSpPr/>
+            <p:nvPr/>
+          </p:nvCxnSpPr>
+          <p:spPr>
+            <a:xfrm flipV="1">
+              <a:off x="6450582" y="2086645"/>
+              <a:ext cx="1228726" cy="8438"/>
+            </a:xfrm>
+            <a:prstGeom prst="line">
+              <a:avLst/>
+            </a:prstGeom>
+          </p:spPr>
+          <p:style>
+            <a:lnRef idx="1">
+              <a:schemeClr val="accent2"/>
+            </a:lnRef>
+            <a:fillRef idx="0">
+              <a:schemeClr val="accent2"/>
+            </a:fillRef>
+            <a:effectRef idx="0">
+              <a:schemeClr val="accent2"/>
+            </a:effectRef>
+            <a:fontRef idx="minor">
+              <a:schemeClr val="tx1"/>
+            </a:fontRef>
+          </p:style>
+        </p:cxnSp>
+        <p:sp>
+          <p:nvSpPr>
+            <p:cNvPr id="46" name="Oval 45"/>
+            <p:cNvSpPr/>
+            <p:nvPr/>
+          </p:nvSpPr>
+          <p:spPr>
+            <a:xfrm>
+              <a:off x="7064945" y="775988"/>
+              <a:ext cx="704850" cy="490373"/>
+            </a:xfrm>
+            <a:prstGeom prst="ellipse">
+              <a:avLst/>
+            </a:prstGeom>
+          </p:spPr>
+          <p:style>
+            <a:lnRef idx="2">
+              <a:schemeClr val="accent6"/>
+            </a:lnRef>
+            <a:fillRef idx="1">
+              <a:schemeClr val="lt1"/>
+            </a:fillRef>
+            <a:effectRef idx="0">
+              <a:schemeClr val="accent6"/>
+            </a:effectRef>
+            <a:fontRef idx="minor">
+              <a:schemeClr val="dk1"/>
+            </a:fontRef>
+          </p:style>
+          <p:txBody>
+            <a:bodyPr lIns="0" tIns="0" rIns="0" bIns="0" rtlCol="0" anchor="ctr"/>
+            <a:lstStyle/>
+            <a:p>
+              <a:pPr algn="ctr"/>
+              <a:r>
+                <a:rPr lang="en-US" sz="1400" u="sng" dirty="0" smtClean="0"/>
+                <a:t>Name</a:t>
+              </a:r>
+              <a:endParaRPr lang="en-US" sz="1400" u="sng" dirty="0"/>
+            </a:p>
+          </p:txBody>
+        </p:sp>
+        <p:cxnSp>
+          <p:nvCxnSpPr>
+            <p:cNvPr id="48" name="Straight Connector 47"/>
+            <p:cNvCxnSpPr>
+              <a:stCxn id="46" idx="4"/>
+            </p:cNvCxnSpPr>
+            <p:nvPr/>
+          </p:nvCxnSpPr>
+          <p:spPr>
+            <a:xfrm>
+              <a:off x="7417370" y="1266361"/>
+              <a:ext cx="366712" cy="442672"/>
+            </a:xfrm>
+            <a:prstGeom prst="line">
+              <a:avLst/>
+            </a:prstGeom>
+          </p:spPr>
+          <p:style>
+            <a:lnRef idx="1">
+              <a:schemeClr val="accent6"/>
+            </a:lnRef>
+            <a:fillRef idx="0">
+              <a:schemeClr val="accent6"/>
+            </a:fillRef>
+            <a:effectRef idx="0">
+              <a:schemeClr val="accent6"/>
+            </a:effectRef>
+            <a:fontRef idx="minor">
+              <a:schemeClr val="tx1"/>
+            </a:fontRef>
+          </p:style>
+        </p:cxnSp>
+        <p:sp>
+          <p:nvSpPr>
+            <p:cNvPr id="49" name="Oval 48"/>
+            <p:cNvSpPr/>
+            <p:nvPr/>
+          </p:nvSpPr>
+          <p:spPr>
+            <a:xfrm>
+              <a:off x="7938120" y="710209"/>
+              <a:ext cx="685800" cy="420211"/>
+            </a:xfrm>
+            <a:prstGeom prst="ellipse">
+              <a:avLst/>
+            </a:prstGeom>
+          </p:spPr>
+          <p:style>
+            <a:lnRef idx="2">
+              <a:schemeClr val="accent6"/>
+            </a:lnRef>
+            <a:fillRef idx="1">
+              <a:schemeClr val="lt1"/>
+            </a:fillRef>
+            <a:effectRef idx="0">
+              <a:schemeClr val="accent6"/>
+            </a:effectRef>
+            <a:fontRef idx="minor">
+              <a:schemeClr val="dk1"/>
+            </a:fontRef>
+          </p:style>
+          <p:txBody>
+            <a:bodyPr lIns="0" tIns="0" rIns="0" bIns="0" rtlCol="0" anchor="ctr"/>
+            <a:lstStyle/>
+            <a:p>
+              <a:pPr algn="ctr"/>
+              <a:r>
+                <a:rPr lang="en-US" sz="1400" dirty="0" smtClean="0"/>
+                <a:t>Words</a:t>
+              </a:r>
+              <a:endParaRPr lang="en-US" sz="1200" dirty="0"/>
+            </a:p>
+          </p:txBody>
+        </p:sp>
+        <p:cxnSp>
+          <p:nvCxnSpPr>
+            <p:cNvPr id="51" name="Straight Connector 50"/>
+            <p:cNvCxnSpPr>
+              <a:stCxn id="49" idx="4"/>
+              <a:endCxn id="39" idx="0"/>
+            </p:cNvCxnSpPr>
+            <p:nvPr/>
+          </p:nvCxnSpPr>
+          <p:spPr>
+            <a:xfrm flipH="1">
+              <a:off x="8146033" y="1130420"/>
+              <a:ext cx="134987" cy="559099"/>
+            </a:xfrm>
+            <a:prstGeom prst="line">
+              <a:avLst/>
+            </a:prstGeom>
+          </p:spPr>
+          <p:style>
+            <a:lnRef idx="1">
+              <a:schemeClr val="accent6"/>
+            </a:lnRef>
+            <a:fillRef idx="0">
+              <a:schemeClr val="accent6"/>
+            </a:fillRef>
+            <a:effectRef idx="0">
+              <a:schemeClr val="accent6"/>
+            </a:effectRef>
+            <a:fontRef idx="minor">
+              <a:schemeClr val="tx1"/>
+            </a:fontRef>
+          </p:style>
+        </p:cxnSp>
+        <p:sp>
+          <p:nvSpPr>
+            <p:cNvPr id="52" name="Oval 51"/>
+            <p:cNvSpPr/>
+            <p:nvPr/>
+          </p:nvSpPr>
+          <p:spPr>
+            <a:xfrm>
+              <a:off x="8792245" y="722325"/>
+              <a:ext cx="790575" cy="489655"/>
+            </a:xfrm>
+            <a:prstGeom prst="ellipse">
+              <a:avLst/>
+            </a:prstGeom>
+          </p:spPr>
+          <p:style>
+            <a:lnRef idx="2">
+              <a:schemeClr val="accent6"/>
+            </a:lnRef>
+            <a:fillRef idx="1">
+              <a:schemeClr val="lt1"/>
+            </a:fillRef>
+            <a:effectRef idx="0">
+              <a:schemeClr val="accent6"/>
+            </a:effectRef>
+            <a:fontRef idx="minor">
+              <a:schemeClr val="dk1"/>
+            </a:fontRef>
+          </p:style>
+          <p:txBody>
+            <a:bodyPr lIns="0" tIns="0" rIns="0" bIns="0" rtlCol="0" anchor="ctr"/>
+            <a:lstStyle/>
+            <a:p>
+              <a:pPr algn="ctr"/>
+              <a:r>
+                <a:rPr lang="en-US" sz="1400" dirty="0" smtClean="0"/>
+                <a:t>Symbol</a:t>
+              </a:r>
+              <a:endParaRPr lang="en-US" sz="1400" dirty="0"/>
+            </a:p>
+          </p:txBody>
+        </p:sp>
+        <p:cxnSp>
+          <p:nvCxnSpPr>
+            <p:cNvPr id="54" name="Straight Connector 53"/>
+            <p:cNvCxnSpPr>
+              <a:endCxn id="52" idx="3"/>
+            </p:cNvCxnSpPr>
+            <p:nvPr/>
+          </p:nvCxnSpPr>
+          <p:spPr>
+            <a:xfrm flipV="1">
+              <a:off x="8488933" y="1140272"/>
+              <a:ext cx="419089" cy="549247"/>
+            </a:xfrm>
+            <a:prstGeom prst="line">
+              <a:avLst/>
+            </a:prstGeom>
+          </p:spPr>
+          <p:style>
+            <a:lnRef idx="1">
+              <a:schemeClr val="accent6"/>
+            </a:lnRef>
+            <a:fillRef idx="0">
+              <a:schemeClr val="accent6"/>
+            </a:fillRef>
+            <a:effectRef idx="0">
+              <a:schemeClr val="accent6"/>
+            </a:effectRef>
+            <a:fontRef idx="minor">
+              <a:schemeClr val="tx1"/>
+            </a:fontRef>
+          </p:style>
+        </p:cxnSp>
+        <p:sp>
+          <p:nvSpPr>
+            <p:cNvPr id="55" name="Rectangle 54"/>
+            <p:cNvSpPr/>
+            <p:nvPr/>
+          </p:nvSpPr>
+          <p:spPr>
+            <a:xfrm>
+              <a:off x="9639970" y="3143127"/>
+              <a:ext cx="992087" cy="504825"/>
+            </a:xfrm>
+            <a:prstGeom prst="rect">
+              <a:avLst/>
+            </a:prstGeom>
+          </p:spPr>
+          <p:style>
+            <a:lnRef idx="2">
+              <a:schemeClr val="dk1"/>
+            </a:lnRef>
+            <a:fillRef idx="1">
+              <a:schemeClr val="lt1"/>
+            </a:fillRef>
+            <a:effectRef idx="0">
+              <a:schemeClr val="dk1"/>
+            </a:effectRef>
+            <a:fontRef idx="minor">
+              <a:schemeClr val="dk1"/>
+            </a:fontRef>
+          </p:style>
+          <p:txBody>
+            <a:bodyPr rtlCol="0" anchor="ctr"/>
+            <a:lstStyle/>
+            <a:p>
+              <a:pPr algn="ctr"/>
+              <a:r>
+                <a:rPr lang="en-US" dirty="0" smtClean="0"/>
+                <a:t>Region</a:t>
+              </a:r>
+              <a:endParaRPr lang="en-US" dirty="0"/>
+            </a:p>
+          </p:txBody>
+        </p:sp>
+        <p:sp>
+          <p:nvSpPr>
+            <p:cNvPr id="56" name="Diamond 55"/>
+            <p:cNvSpPr/>
+            <p:nvPr/>
+          </p:nvSpPr>
+          <p:spPr>
+            <a:xfrm>
+              <a:off x="9212833" y="2086645"/>
+              <a:ext cx="666750" cy="627692"/>
+            </a:xfrm>
+            <a:prstGeom prst="diamond">
+              <a:avLst/>
+            </a:prstGeom>
+          </p:spPr>
+          <p:style>
+            <a:lnRef idx="2">
+              <a:schemeClr val="accent2"/>
+            </a:lnRef>
+            <a:fillRef idx="1">
+              <a:schemeClr val="lt1"/>
+            </a:fillRef>
+            <a:effectRef idx="0">
+              <a:schemeClr val="accent2"/>
+            </a:effectRef>
+            <a:fontRef idx="minor">
+              <a:schemeClr val="dk1"/>
+            </a:fontRef>
+          </p:style>
+          <p:txBody>
+            <a:bodyPr rtlCol="0" anchor="ctr"/>
+            <a:lstStyle/>
+            <a:p>
+              <a:pPr algn="ctr"/>
+              <a:r>
+                <a:rPr lang="en-US" sz="1400" dirty="0" smtClean="0"/>
+                <a:t>In</a:t>
+              </a:r>
+              <a:endParaRPr lang="en-US" dirty="0"/>
+            </a:p>
+          </p:txBody>
+        </p:sp>
+        <p:cxnSp>
+          <p:nvCxnSpPr>
+            <p:cNvPr id="58" name="Straight Connector 57"/>
+            <p:cNvCxnSpPr>
+              <a:stCxn id="39" idx="3"/>
+            </p:cNvCxnSpPr>
+            <p:nvPr/>
+          </p:nvCxnSpPr>
+          <p:spPr>
+            <a:xfrm>
+              <a:off x="8612758" y="1988757"/>
+              <a:ext cx="733424" cy="299238"/>
+            </a:xfrm>
+            <a:prstGeom prst="line">
+              <a:avLst/>
+            </a:prstGeom>
+          </p:spPr>
+          <p:style>
+            <a:lnRef idx="1">
+              <a:schemeClr val="accent2"/>
+            </a:lnRef>
+            <a:fillRef idx="0">
+              <a:schemeClr val="accent2"/>
+            </a:fillRef>
+            <a:effectRef idx="0">
+              <a:schemeClr val="accent2"/>
+            </a:effectRef>
+            <a:fontRef idx="minor">
+              <a:schemeClr val="tx1"/>
+            </a:fontRef>
+          </p:style>
+        </p:cxnSp>
+        <p:cxnSp>
+          <p:nvCxnSpPr>
+            <p:cNvPr id="60" name="Straight Connector 59"/>
+            <p:cNvCxnSpPr>
+              <a:endCxn id="55" idx="0"/>
+            </p:cNvCxnSpPr>
+            <p:nvPr/>
+          </p:nvCxnSpPr>
+          <p:spPr>
+            <a:xfrm>
+              <a:off x="9708132" y="2578220"/>
+              <a:ext cx="427882" cy="564907"/>
+            </a:xfrm>
+            <a:prstGeom prst="line">
+              <a:avLst/>
+            </a:prstGeom>
+          </p:spPr>
+          <p:style>
+            <a:lnRef idx="1">
+              <a:schemeClr val="accent2"/>
+            </a:lnRef>
+            <a:fillRef idx="0">
+              <a:schemeClr val="accent2"/>
+            </a:fillRef>
+            <a:effectRef idx="0">
+              <a:schemeClr val="accent2"/>
+            </a:effectRef>
+            <a:fontRef idx="minor">
+              <a:schemeClr val="tx1"/>
+            </a:fontRef>
+          </p:style>
+        </p:cxnSp>
+        <p:sp>
+          <p:nvSpPr>
+            <p:cNvPr id="62" name="Oval 61"/>
+            <p:cNvSpPr/>
+            <p:nvPr/>
+          </p:nvSpPr>
+          <p:spPr>
+            <a:xfrm>
+              <a:off x="11222607" y="3165109"/>
+              <a:ext cx="685800" cy="466725"/>
+            </a:xfrm>
+            <a:prstGeom prst="ellipse">
+              <a:avLst/>
+            </a:prstGeom>
+          </p:spPr>
+          <p:style>
+            <a:lnRef idx="2">
+              <a:schemeClr val="accent6"/>
+            </a:lnRef>
+            <a:fillRef idx="1">
+              <a:schemeClr val="lt1"/>
+            </a:fillRef>
+            <a:effectRef idx="0">
+              <a:schemeClr val="accent6"/>
+            </a:effectRef>
+            <a:fontRef idx="minor">
+              <a:schemeClr val="dk1"/>
+            </a:fontRef>
+          </p:style>
+          <p:txBody>
+            <a:bodyPr lIns="0" tIns="0" rIns="0" bIns="0" rtlCol="0" anchor="ctr"/>
+            <a:lstStyle/>
+            <a:p>
+              <a:pPr algn="ctr"/>
+              <a:r>
+                <a:rPr lang="en-US" sz="1100" u="sng" dirty="0" smtClean="0"/>
+                <a:t>RName</a:t>
+              </a:r>
+              <a:endParaRPr lang="en-US" sz="1100" u="sng" dirty="0"/>
+            </a:p>
+          </p:txBody>
+        </p:sp>
+        <p:cxnSp>
+          <p:nvCxnSpPr>
+            <p:cNvPr id="64" name="Straight Connector 63"/>
+            <p:cNvCxnSpPr>
+              <a:stCxn id="55" idx="3"/>
+              <a:endCxn id="62" idx="2"/>
+            </p:cNvCxnSpPr>
+            <p:nvPr/>
+          </p:nvCxnSpPr>
+          <p:spPr>
+            <a:xfrm>
+              <a:off x="10632057" y="3395540"/>
+              <a:ext cx="590550" cy="2932"/>
+            </a:xfrm>
+            <a:prstGeom prst="line">
+              <a:avLst/>
+            </a:prstGeom>
+          </p:spPr>
+          <p:style>
+            <a:lnRef idx="1">
+              <a:schemeClr val="accent6"/>
+            </a:lnRef>
+            <a:fillRef idx="0">
+              <a:schemeClr val="accent6"/>
+            </a:fillRef>
+            <a:effectRef idx="0">
+              <a:schemeClr val="accent6"/>
+            </a:effectRef>
+            <a:fontRef idx="minor">
+              <a:schemeClr val="tx1"/>
+            </a:fontRef>
+          </p:style>
+        </p:cxnSp>
+        <p:sp>
+          <p:nvSpPr>
+            <p:cNvPr id="66" name="Rectangle 65"/>
+            <p:cNvSpPr/>
+            <p:nvPr/>
+          </p:nvSpPr>
+          <p:spPr>
+            <a:xfrm>
+              <a:off x="6533926" y="4243264"/>
+              <a:ext cx="1066800" cy="563806"/>
+            </a:xfrm>
+            <a:prstGeom prst="rect">
+              <a:avLst/>
+            </a:prstGeom>
+          </p:spPr>
+          <p:style>
+            <a:lnRef idx="2">
+              <a:schemeClr val="dk1"/>
+            </a:lnRef>
+            <a:fillRef idx="1">
+              <a:schemeClr val="lt1"/>
+            </a:fillRef>
+            <a:effectRef idx="0">
+              <a:schemeClr val="dk1"/>
+            </a:effectRef>
+            <a:fontRef idx="minor">
+              <a:schemeClr val="dk1"/>
+            </a:fontRef>
+          </p:style>
+          <p:txBody>
+            <a:bodyPr rtlCol="0" anchor="ctr"/>
+            <a:lstStyle/>
+            <a:p>
+              <a:pPr algn="ctr"/>
+              <a:r>
+                <a:rPr lang="en-US" dirty="0" smtClean="0"/>
+                <a:t>Battle</a:t>
+              </a:r>
+              <a:endParaRPr lang="en-US" dirty="0"/>
+            </a:p>
+          </p:txBody>
+        </p:sp>
+        <p:sp>
+          <p:nvSpPr>
+            <p:cNvPr id="67" name="Diamond 66"/>
+            <p:cNvSpPr/>
+            <p:nvPr/>
+          </p:nvSpPr>
+          <p:spPr>
+            <a:xfrm>
+              <a:off x="6841106" y="2806954"/>
+              <a:ext cx="942976" cy="853082"/>
+            </a:xfrm>
+            <a:prstGeom prst="diamond">
+              <a:avLst/>
+            </a:prstGeom>
+          </p:spPr>
+          <p:style>
+            <a:lnRef idx="2">
+              <a:schemeClr val="accent2"/>
+            </a:lnRef>
+            <a:fillRef idx="1">
+              <a:schemeClr val="lt1"/>
+            </a:fillRef>
+            <a:effectRef idx="0">
+              <a:schemeClr val="accent2"/>
+            </a:effectRef>
+            <a:fontRef idx="minor">
+              <a:schemeClr val="dk1"/>
+            </a:fontRef>
+          </p:style>
+          <p:txBody>
+            <a:bodyPr lIns="0" tIns="0" rIns="0" bIns="0" rtlCol="0" anchor="ctr"/>
+            <a:lstStyle/>
+            <a:p>
+              <a:pPr algn="ctr"/>
+              <a:r>
+                <a:rPr lang="en-US" sz="1050" dirty="0" smtClean="0"/>
+                <a:t>Partakes in</a:t>
+              </a:r>
+              <a:endParaRPr lang="en-US" sz="1050" dirty="0"/>
+            </a:p>
+          </p:txBody>
+        </p:sp>
+        <p:cxnSp>
+          <p:nvCxnSpPr>
+            <p:cNvPr id="69" name="Straight Connector 68"/>
+            <p:cNvCxnSpPr/>
+            <p:nvPr/>
+          </p:nvCxnSpPr>
+          <p:spPr>
+            <a:xfrm flipH="1">
+              <a:off x="7507857" y="2287995"/>
+              <a:ext cx="361950" cy="664513"/>
+            </a:xfrm>
+            <a:prstGeom prst="line">
+              <a:avLst/>
+            </a:prstGeom>
+          </p:spPr>
+          <p:style>
+            <a:lnRef idx="1">
+              <a:schemeClr val="accent2"/>
+            </a:lnRef>
+            <a:fillRef idx="0">
+              <a:schemeClr val="accent2"/>
+            </a:fillRef>
+            <a:effectRef idx="0">
+              <a:schemeClr val="accent2"/>
+            </a:effectRef>
+            <a:fontRef idx="minor">
+              <a:schemeClr val="tx1"/>
+            </a:fontRef>
+          </p:style>
+        </p:cxnSp>
+        <p:cxnSp>
+          <p:nvCxnSpPr>
+            <p:cNvPr id="71" name="Straight Connector 70"/>
+            <p:cNvCxnSpPr>
+              <a:endCxn id="66" idx="0"/>
+            </p:cNvCxnSpPr>
+            <p:nvPr/>
+          </p:nvCxnSpPr>
+          <p:spPr>
+            <a:xfrm flipH="1">
+              <a:off x="7067326" y="3514483"/>
+              <a:ext cx="69056" cy="728781"/>
+            </a:xfrm>
+            <a:prstGeom prst="line">
+              <a:avLst/>
+            </a:prstGeom>
+          </p:spPr>
+          <p:style>
+            <a:lnRef idx="1">
+              <a:schemeClr val="accent2"/>
+            </a:lnRef>
+            <a:fillRef idx="0">
+              <a:schemeClr val="accent2"/>
+            </a:fillRef>
+            <a:effectRef idx="0">
+              <a:schemeClr val="accent2"/>
+            </a:effectRef>
+            <a:fontRef idx="minor">
+              <a:schemeClr val="tx1"/>
+            </a:fontRef>
+          </p:style>
+        </p:cxnSp>
+        <p:sp>
+          <p:nvSpPr>
+            <p:cNvPr id="72" name="Diamond 71"/>
+            <p:cNvSpPr/>
+            <p:nvPr/>
+          </p:nvSpPr>
+          <p:spPr>
+            <a:xfrm>
+              <a:off x="8238901" y="3728139"/>
+              <a:ext cx="857249" cy="798142"/>
+            </a:xfrm>
+            <a:prstGeom prst="diamond">
+              <a:avLst/>
+            </a:prstGeom>
+          </p:spPr>
+          <p:style>
+            <a:lnRef idx="2">
+              <a:schemeClr val="accent2"/>
+            </a:lnRef>
+            <a:fillRef idx="1">
+              <a:schemeClr val="lt1"/>
+            </a:fillRef>
+            <a:effectRef idx="0">
+              <a:schemeClr val="accent2"/>
+            </a:effectRef>
+            <a:fontRef idx="minor">
+              <a:schemeClr val="dk1"/>
+            </a:fontRef>
+          </p:style>
+          <p:txBody>
+            <a:bodyPr lIns="0" rIns="0" rtlCol="0" anchor="ctr"/>
+            <a:lstStyle/>
+            <a:p>
+              <a:pPr algn="ctr"/>
+              <a:r>
+                <a:rPr lang="en-US" sz="1000" dirty="0" smtClean="0"/>
+                <a:t>Takes place in</a:t>
+              </a:r>
+              <a:endParaRPr lang="en-US" sz="1000" dirty="0"/>
+            </a:p>
+          </p:txBody>
+        </p:sp>
+        <p:cxnSp>
+          <p:nvCxnSpPr>
+            <p:cNvPr id="74" name="Straight Connector 73"/>
+            <p:cNvCxnSpPr/>
+            <p:nvPr/>
+          </p:nvCxnSpPr>
+          <p:spPr>
+            <a:xfrm flipV="1">
+              <a:off x="7600726" y="4295224"/>
+              <a:ext cx="812006" cy="281903"/>
+            </a:xfrm>
+            <a:prstGeom prst="line">
+              <a:avLst/>
+            </a:prstGeom>
+          </p:spPr>
+          <p:style>
+            <a:lnRef idx="1">
+              <a:schemeClr val="accent2"/>
+            </a:lnRef>
+            <a:fillRef idx="0">
+              <a:schemeClr val="accent2"/>
+            </a:fillRef>
+            <a:effectRef idx="0">
+              <a:schemeClr val="accent2"/>
+            </a:effectRef>
+            <a:fontRef idx="minor">
+              <a:schemeClr val="tx1"/>
+            </a:fontRef>
+          </p:style>
+        </p:cxnSp>
+        <p:cxnSp>
+          <p:nvCxnSpPr>
+            <p:cNvPr id="77" name="Straight Connector 76"/>
+            <p:cNvCxnSpPr>
+              <a:endCxn id="55" idx="1"/>
+            </p:cNvCxnSpPr>
+            <p:nvPr/>
+          </p:nvCxnSpPr>
+          <p:spPr>
+            <a:xfrm flipV="1">
+              <a:off x="8792245" y="3395540"/>
+              <a:ext cx="847725" cy="483333"/>
+            </a:xfrm>
+            <a:prstGeom prst="line">
+              <a:avLst/>
+            </a:prstGeom>
+          </p:spPr>
+          <p:style>
+            <a:lnRef idx="1">
+              <a:schemeClr val="accent2"/>
+            </a:lnRef>
+            <a:fillRef idx="0">
+              <a:schemeClr val="accent2"/>
+            </a:fillRef>
+            <a:effectRef idx="0">
+              <a:schemeClr val="accent2"/>
+            </a:effectRef>
+            <a:fontRef idx="minor">
+              <a:schemeClr val="tx1"/>
+            </a:fontRef>
+          </p:style>
+        </p:cxnSp>
+        <p:sp>
+          <p:nvSpPr>
+            <p:cNvPr id="85" name="Rectangle 84"/>
+            <p:cNvSpPr/>
+            <p:nvPr/>
+          </p:nvSpPr>
+          <p:spPr>
+            <a:xfrm>
+              <a:off x="2821557" y="4911958"/>
+              <a:ext cx="1831426" cy="676275"/>
+            </a:xfrm>
+            <a:prstGeom prst="rect">
+              <a:avLst/>
+            </a:prstGeom>
+          </p:spPr>
+          <p:style>
+            <a:lnRef idx="2">
+              <a:schemeClr val="dk1"/>
+            </a:lnRef>
+            <a:fillRef idx="1">
+              <a:schemeClr val="lt1"/>
+            </a:fillRef>
+            <a:effectRef idx="0">
+              <a:schemeClr val="dk1"/>
+            </a:effectRef>
+            <a:fontRef idx="minor">
+              <a:schemeClr val="dk1"/>
+            </a:fontRef>
+          </p:style>
+          <p:txBody>
+            <a:bodyPr rtlCol="0" anchor="ctr"/>
+            <a:lstStyle/>
+            <a:p>
+              <a:pPr algn="ctr"/>
+              <a:r>
+                <a:rPr lang="en-US" dirty="0" smtClean="0"/>
+                <a:t>Episode</a:t>
+              </a:r>
+              <a:endParaRPr lang="en-US" dirty="0"/>
+            </a:p>
+          </p:txBody>
+        </p:sp>
+        <p:sp>
+          <p:nvSpPr>
+            <p:cNvPr id="86" name="Diamond 85"/>
+            <p:cNvSpPr/>
+            <p:nvPr/>
+          </p:nvSpPr>
+          <p:spPr>
+            <a:xfrm>
+              <a:off x="2750748" y="3431940"/>
+              <a:ext cx="833722" cy="728709"/>
+            </a:xfrm>
+            <a:prstGeom prst="diamond">
+              <a:avLst/>
+            </a:prstGeom>
+          </p:spPr>
+          <p:style>
+            <a:lnRef idx="2">
+              <a:schemeClr val="accent2"/>
+            </a:lnRef>
+            <a:fillRef idx="1">
+              <a:schemeClr val="lt1"/>
+            </a:fillRef>
+            <a:effectRef idx="0">
+              <a:schemeClr val="accent2"/>
+            </a:effectRef>
+            <a:fontRef idx="minor">
+              <a:schemeClr val="dk1"/>
+            </a:fontRef>
+          </p:style>
+          <p:txBody>
+            <a:bodyPr lIns="0" tIns="0" rIns="0" bIns="0" rtlCol="0" anchor="ctr"/>
+            <a:lstStyle/>
+            <a:p>
+              <a:pPr algn="ctr"/>
+              <a:r>
+                <a:rPr lang="en-US" sz="950" dirty="0" smtClean="0"/>
+                <a:t>Appears</a:t>
+              </a:r>
+              <a:endParaRPr lang="en-US" sz="950" dirty="0"/>
+            </a:p>
+          </p:txBody>
+        </p:sp>
+        <p:sp>
+          <p:nvSpPr>
+            <p:cNvPr id="87" name="Diamond 86"/>
+            <p:cNvSpPr/>
+            <p:nvPr/>
+          </p:nvSpPr>
+          <p:spPr>
+            <a:xfrm>
+              <a:off x="3720953" y="3441234"/>
+              <a:ext cx="833722" cy="728709"/>
+            </a:xfrm>
+            <a:prstGeom prst="diamond">
+              <a:avLst/>
+            </a:prstGeom>
+          </p:spPr>
+          <p:style>
+            <a:lnRef idx="2">
+              <a:schemeClr val="accent2"/>
+            </a:lnRef>
+            <a:fillRef idx="1">
+              <a:schemeClr val="lt1"/>
+            </a:fillRef>
+            <a:effectRef idx="0">
+              <a:schemeClr val="accent2"/>
+            </a:effectRef>
+            <a:fontRef idx="minor">
+              <a:schemeClr val="dk1"/>
+            </a:fontRef>
+          </p:style>
+          <p:txBody>
+            <a:bodyPr lIns="0" tIns="0" rIns="0" bIns="0" rtlCol="0" anchor="ctr"/>
+            <a:lstStyle/>
+            <a:p>
+              <a:pPr algn="ctr"/>
+              <a:r>
+                <a:rPr lang="en-US" sz="1100" dirty="0" smtClean="0"/>
+                <a:t>Dies</a:t>
+              </a:r>
+              <a:endParaRPr lang="en-US" sz="950" dirty="0"/>
+            </a:p>
+          </p:txBody>
+        </p:sp>
+        <p:cxnSp>
+          <p:nvCxnSpPr>
+            <p:cNvPr id="89" name="Straight Connector 88"/>
+            <p:cNvCxnSpPr>
+              <a:endCxn id="86" idx="0"/>
+            </p:cNvCxnSpPr>
+            <p:nvPr/>
+          </p:nvCxnSpPr>
+          <p:spPr>
+            <a:xfrm>
+              <a:off x="3165799" y="2297167"/>
+              <a:ext cx="1810" cy="1134773"/>
+            </a:xfrm>
+            <a:prstGeom prst="line">
+              <a:avLst/>
+            </a:prstGeom>
+          </p:spPr>
+          <p:style>
+            <a:lnRef idx="1">
+              <a:schemeClr val="accent2"/>
+            </a:lnRef>
+            <a:fillRef idx="0">
+              <a:schemeClr val="accent2"/>
+            </a:fillRef>
+            <a:effectRef idx="0">
+              <a:schemeClr val="accent2"/>
+            </a:effectRef>
+            <a:fontRef idx="minor">
+              <a:schemeClr val="tx1"/>
+            </a:fontRef>
+          </p:style>
+        </p:cxnSp>
+        <p:cxnSp>
+          <p:nvCxnSpPr>
+            <p:cNvPr id="92" name="Straight Connector 91"/>
+            <p:cNvCxnSpPr>
+              <a:endCxn id="87" idx="0"/>
+            </p:cNvCxnSpPr>
+            <p:nvPr/>
+          </p:nvCxnSpPr>
+          <p:spPr>
+            <a:xfrm>
+              <a:off x="3926465" y="2297228"/>
+              <a:ext cx="211349" cy="1144006"/>
+            </a:xfrm>
+            <a:prstGeom prst="line">
+              <a:avLst/>
+            </a:prstGeom>
+          </p:spPr>
+          <p:style>
+            <a:lnRef idx="1">
+              <a:schemeClr val="accent2"/>
+            </a:lnRef>
+            <a:fillRef idx="0">
+              <a:schemeClr val="accent2"/>
+            </a:fillRef>
+            <a:effectRef idx="0">
+              <a:schemeClr val="accent2"/>
+            </a:effectRef>
+            <a:fontRef idx="minor">
+              <a:schemeClr val="tx1"/>
+            </a:fontRef>
+          </p:style>
+        </p:cxnSp>
+        <p:cxnSp>
+          <p:nvCxnSpPr>
+            <p:cNvPr id="94" name="Straight Connector 93"/>
+            <p:cNvCxnSpPr>
+              <a:stCxn id="86" idx="2"/>
+            </p:cNvCxnSpPr>
+            <p:nvPr/>
+          </p:nvCxnSpPr>
+          <p:spPr>
+            <a:xfrm flipH="1">
+              <a:off x="3165799" y="4160649"/>
+              <a:ext cx="1810" cy="763853"/>
+            </a:xfrm>
+            <a:prstGeom prst="line">
+              <a:avLst/>
+            </a:prstGeom>
+          </p:spPr>
+          <p:style>
+            <a:lnRef idx="1">
+              <a:schemeClr val="accent2"/>
+            </a:lnRef>
+            <a:fillRef idx="0">
+              <a:schemeClr val="accent2"/>
+            </a:fillRef>
+            <a:effectRef idx="0">
+              <a:schemeClr val="accent2"/>
+            </a:effectRef>
+            <a:fontRef idx="minor">
+              <a:schemeClr val="tx1"/>
+            </a:fontRef>
+          </p:style>
+        </p:cxnSp>
+        <p:cxnSp>
+          <p:nvCxnSpPr>
+            <p:cNvPr id="96" name="Straight Connector 95"/>
+            <p:cNvCxnSpPr>
+              <a:stCxn id="87" idx="2"/>
+            </p:cNvCxnSpPr>
+            <p:nvPr/>
+          </p:nvCxnSpPr>
+          <p:spPr>
+            <a:xfrm>
+              <a:off x="4137814" y="4169943"/>
+              <a:ext cx="0" cy="754559"/>
+            </a:xfrm>
+            <a:prstGeom prst="line">
+              <a:avLst/>
+            </a:prstGeom>
+          </p:spPr>
+          <p:style>
+            <a:lnRef idx="1">
+              <a:schemeClr val="accent2"/>
+            </a:lnRef>
+            <a:fillRef idx="0">
+              <a:schemeClr val="accent2"/>
+            </a:fillRef>
+            <a:effectRef idx="0">
+              <a:schemeClr val="accent2"/>
+            </a:effectRef>
+            <a:fontRef idx="minor">
+              <a:schemeClr val="tx1"/>
+            </a:fontRef>
+          </p:style>
+        </p:cxnSp>
+        <p:sp>
+          <p:nvSpPr>
+            <p:cNvPr id="97" name="Oval 96"/>
+            <p:cNvSpPr/>
+            <p:nvPr/>
+          </p:nvSpPr>
+          <p:spPr>
+            <a:xfrm>
+              <a:off x="1095741" y="4980859"/>
+              <a:ext cx="827419" cy="538471"/>
+            </a:xfrm>
+            <a:prstGeom prst="ellipse">
+              <a:avLst/>
+            </a:prstGeom>
+          </p:spPr>
+          <p:style>
+            <a:lnRef idx="2">
+              <a:schemeClr val="accent6"/>
+            </a:lnRef>
+            <a:fillRef idx="1">
+              <a:schemeClr val="lt1"/>
+            </a:fillRef>
+            <a:effectRef idx="0">
+              <a:schemeClr val="accent6"/>
+            </a:effectRef>
+            <a:fontRef idx="minor">
+              <a:schemeClr val="dk1"/>
+            </a:fontRef>
+          </p:style>
+          <p:txBody>
+            <a:bodyPr rtlCol="0" anchor="ctr"/>
+            <a:lstStyle/>
+            <a:p>
+              <a:pPr algn="ctr"/>
+              <a:r>
+                <a:rPr lang="en-US" u="sng" dirty="0" smtClean="0"/>
+                <a:t>EID</a:t>
+              </a:r>
+              <a:endParaRPr lang="en-US" u="sng" dirty="0"/>
+            </a:p>
+          </p:txBody>
+        </p:sp>
+        <p:cxnSp>
+          <p:nvCxnSpPr>
+            <p:cNvPr id="99" name="Straight Connector 98"/>
+            <p:cNvCxnSpPr>
+              <a:stCxn id="97" idx="6"/>
+              <a:endCxn id="85" idx="1"/>
+            </p:cNvCxnSpPr>
+            <p:nvPr/>
+          </p:nvCxnSpPr>
+          <p:spPr>
+            <a:xfrm>
+              <a:off x="1923160" y="5250095"/>
+              <a:ext cx="898397" cy="1"/>
+            </a:xfrm>
+            <a:prstGeom prst="line">
+              <a:avLst/>
+            </a:prstGeom>
+          </p:spPr>
+          <p:style>
+            <a:lnRef idx="1">
+              <a:schemeClr val="accent6"/>
+            </a:lnRef>
+            <a:fillRef idx="0">
+              <a:schemeClr val="accent6"/>
+            </a:fillRef>
+            <a:effectRef idx="0">
+              <a:schemeClr val="accent6"/>
+            </a:effectRef>
+            <a:fontRef idx="minor">
+              <a:schemeClr val="tx1"/>
+            </a:fontRef>
+          </p:style>
+        </p:cxnSp>
+        <p:sp>
+          <p:nvSpPr>
+            <p:cNvPr id="101" name="Oval 100"/>
+            <p:cNvSpPr/>
+            <p:nvPr/>
+          </p:nvSpPr>
+          <p:spPr>
+            <a:xfrm>
+              <a:off x="1505394" y="5857467"/>
+              <a:ext cx="915747" cy="613775"/>
+            </a:xfrm>
+            <a:prstGeom prst="ellipse">
+              <a:avLst/>
+            </a:prstGeom>
+          </p:spPr>
+          <p:style>
+            <a:lnRef idx="2">
+              <a:schemeClr val="accent6"/>
+            </a:lnRef>
+            <a:fillRef idx="1">
+              <a:schemeClr val="lt1"/>
+            </a:fillRef>
+            <a:effectRef idx="0">
+              <a:schemeClr val="accent6"/>
+            </a:effectRef>
+            <a:fontRef idx="minor">
+              <a:schemeClr val="dk1"/>
+            </a:fontRef>
+          </p:style>
+          <p:txBody>
+            <a:bodyPr lIns="0" rIns="0" rtlCol="0" anchor="ctr"/>
+            <a:lstStyle/>
+            <a:p>
+              <a:pPr algn="ctr"/>
+              <a:r>
+                <a:rPr lang="en-US" sz="1600" dirty="0" smtClean="0"/>
+                <a:t>Season</a:t>
+              </a:r>
+              <a:endParaRPr lang="en-US" sz="1600" dirty="0"/>
+            </a:p>
+          </p:txBody>
+        </p:sp>
+        <p:cxnSp>
+          <p:nvCxnSpPr>
+            <p:cNvPr id="103" name="Straight Connector 102"/>
+            <p:cNvCxnSpPr>
+              <a:stCxn id="101" idx="7"/>
+            </p:cNvCxnSpPr>
+            <p:nvPr/>
+          </p:nvCxnSpPr>
+          <p:spPr>
+            <a:xfrm flipV="1">
+              <a:off x="2287033" y="5519330"/>
+              <a:ext cx="534524" cy="428022"/>
+            </a:xfrm>
+            <a:prstGeom prst="line">
+              <a:avLst/>
+            </a:prstGeom>
+          </p:spPr>
+          <p:style>
+            <a:lnRef idx="1">
+              <a:schemeClr val="accent6"/>
+            </a:lnRef>
+            <a:fillRef idx="0">
+              <a:schemeClr val="accent6"/>
+            </a:fillRef>
+            <a:effectRef idx="0">
+              <a:schemeClr val="accent6"/>
+            </a:effectRef>
+            <a:fontRef idx="minor">
+              <a:schemeClr val="tx1"/>
+            </a:fontRef>
+          </p:style>
+        </p:cxnSp>
+        <p:sp>
+          <p:nvSpPr>
+            <p:cNvPr id="104" name="Diamond 103"/>
+            <p:cNvSpPr/>
+            <p:nvPr/>
+          </p:nvSpPr>
+          <p:spPr>
+            <a:xfrm>
+              <a:off x="5214462" y="4482877"/>
+              <a:ext cx="845031" cy="767217"/>
+            </a:xfrm>
+            <a:prstGeom prst="diamond">
+              <a:avLst/>
+            </a:prstGeom>
+          </p:spPr>
+          <p:style>
+            <a:lnRef idx="2">
+              <a:schemeClr val="accent2"/>
+            </a:lnRef>
+            <a:fillRef idx="1">
+              <a:schemeClr val="lt1"/>
+            </a:fillRef>
+            <a:effectRef idx="0">
+              <a:schemeClr val="accent2"/>
+            </a:effectRef>
+            <a:fontRef idx="minor">
+              <a:schemeClr val="dk1"/>
+            </a:fontRef>
+          </p:style>
+          <p:txBody>
+            <a:bodyPr lIns="0" tIns="0" rIns="0" bIns="0" rtlCol="0" anchor="ctr"/>
+            <a:lstStyle/>
+            <a:p>
+              <a:pPr algn="ctr"/>
+              <a:r>
+                <a:rPr lang="en-US" sz="1600" dirty="0" smtClean="0"/>
+                <a:t>Has</a:t>
+              </a:r>
+              <a:endParaRPr lang="en-US" dirty="0"/>
+            </a:p>
+          </p:txBody>
+        </p:sp>
+        <p:cxnSp>
+          <p:nvCxnSpPr>
+            <p:cNvPr id="106" name="Straight Connector 105"/>
+            <p:cNvCxnSpPr/>
+            <p:nvPr/>
+          </p:nvCxnSpPr>
+          <p:spPr>
+            <a:xfrm flipV="1">
+              <a:off x="5895751" y="4444497"/>
+              <a:ext cx="650081" cy="281904"/>
+            </a:xfrm>
+            <a:prstGeom prst="line">
+              <a:avLst/>
+            </a:prstGeom>
+          </p:spPr>
+          <p:style>
+            <a:lnRef idx="1">
+              <a:schemeClr val="accent2"/>
+            </a:lnRef>
+            <a:fillRef idx="0">
+              <a:schemeClr val="accent2"/>
+            </a:fillRef>
+            <a:effectRef idx="0">
+              <a:schemeClr val="accent2"/>
+            </a:effectRef>
+            <a:fontRef idx="minor">
+              <a:schemeClr val="tx1"/>
+            </a:fontRef>
+          </p:style>
+        </p:cxnSp>
+        <p:cxnSp>
+          <p:nvCxnSpPr>
+            <p:cNvPr id="109" name="Straight Connector 108"/>
+            <p:cNvCxnSpPr/>
+            <p:nvPr/>
+          </p:nvCxnSpPr>
+          <p:spPr>
+            <a:xfrm flipV="1">
+              <a:off x="4637237" y="4980859"/>
+              <a:ext cx="705705" cy="314177"/>
+            </a:xfrm>
+            <a:prstGeom prst="line">
+              <a:avLst/>
+            </a:prstGeom>
+          </p:spPr>
+          <p:style>
+            <a:lnRef idx="1">
+              <a:schemeClr val="accent2"/>
+            </a:lnRef>
+            <a:fillRef idx="0">
+              <a:schemeClr val="accent2"/>
+            </a:fillRef>
+            <a:effectRef idx="0">
+              <a:schemeClr val="accent2"/>
+            </a:effectRef>
+            <a:fontRef idx="minor">
+              <a:schemeClr val="tx1"/>
+            </a:fontRef>
+          </p:style>
+        </p:cxnSp>
+        <p:cxnSp>
+          <p:nvCxnSpPr>
+            <p:cNvPr id="116" name="Straight Connector 115"/>
+            <p:cNvCxnSpPr>
+              <a:stCxn id="66" idx="3"/>
+            </p:cNvCxnSpPr>
+            <p:nvPr/>
+          </p:nvCxnSpPr>
+          <p:spPr>
+            <a:xfrm flipV="1">
+              <a:off x="7600726" y="4243264"/>
+              <a:ext cx="812006" cy="281903"/>
+            </a:xfrm>
+            <a:prstGeom prst="line">
+              <a:avLst/>
+            </a:prstGeom>
+          </p:spPr>
+          <p:style>
+            <a:lnRef idx="1">
+              <a:schemeClr val="accent2"/>
+            </a:lnRef>
+            <a:fillRef idx="0">
+              <a:schemeClr val="accent2"/>
+            </a:fillRef>
+            <a:effectRef idx="0">
+              <a:schemeClr val="accent2"/>
+            </a:effectRef>
+            <a:fontRef idx="minor">
+              <a:schemeClr val="tx1"/>
+            </a:fontRef>
+          </p:style>
+        </p:cxnSp>
+        <p:sp>
+          <p:nvSpPr>
+            <p:cNvPr id="117" name="Oval 116"/>
+            <p:cNvSpPr/>
+            <p:nvPr/>
+          </p:nvSpPr>
+          <p:spPr>
+            <a:xfrm>
+              <a:off x="7440363" y="5080571"/>
+              <a:ext cx="773163" cy="483247"/>
+            </a:xfrm>
+            <a:prstGeom prst="ellipse">
+              <a:avLst/>
+            </a:prstGeom>
+          </p:spPr>
+          <p:style>
+            <a:lnRef idx="2">
+              <a:schemeClr val="accent6"/>
+            </a:lnRef>
+            <a:fillRef idx="1">
+              <a:schemeClr val="lt1"/>
+            </a:fillRef>
+            <a:effectRef idx="0">
+              <a:schemeClr val="accent6"/>
+            </a:effectRef>
+            <a:fontRef idx="minor">
+              <a:schemeClr val="dk1"/>
+            </a:fontRef>
+          </p:style>
+          <p:txBody>
+            <a:bodyPr lIns="0" rIns="0" rtlCol="0" anchor="ctr"/>
+            <a:lstStyle/>
+            <a:p>
+              <a:pPr algn="ctr"/>
+              <a:r>
+                <a:rPr lang="en-US" sz="1400" u="sng" dirty="0" smtClean="0"/>
+                <a:t>Name</a:t>
+              </a:r>
+              <a:endParaRPr lang="en-US" sz="1400" u="sng" dirty="0"/>
+            </a:p>
+          </p:txBody>
+        </p:sp>
+        <p:cxnSp>
+          <p:nvCxnSpPr>
+            <p:cNvPr id="119" name="Straight Connector 118"/>
+            <p:cNvCxnSpPr/>
+            <p:nvPr/>
+          </p:nvCxnSpPr>
+          <p:spPr>
+            <a:xfrm>
+              <a:off x="7417370" y="4807070"/>
+              <a:ext cx="271462" cy="293619"/>
+            </a:xfrm>
+            <a:prstGeom prst="line">
+              <a:avLst/>
+            </a:prstGeom>
+          </p:spPr>
+          <p:style>
+            <a:lnRef idx="1">
+              <a:schemeClr val="accent6"/>
+            </a:lnRef>
+            <a:fillRef idx="0">
+              <a:schemeClr val="accent6"/>
+            </a:fillRef>
+            <a:effectRef idx="0">
+              <a:schemeClr val="accent6"/>
+            </a:effectRef>
+            <a:fontRef idx="minor">
+              <a:schemeClr val="tx1"/>
+            </a:fontRef>
+          </p:style>
+        </p:cxnSp>
+      </p:grpSp>
     </p:spTree>
     <p:extLst>
       <p:ext uri="{BB962C8B-B14F-4D97-AF65-F5344CB8AC3E}">

</xml_diff>